<commit_message>
Updated preloader, added sounds, added level 3 and implemented upgrade function
</commit_message>
<xml_diff>
--- a/COMP397_Presentation.pptx
+++ b/COMP397_Presentation.pptx
@@ -5,16 +5,15 @@
     <p:sldMasterId id="2147483660" r:id="rId1"/>
   </p:sldMasterIdLst>
   <p:notesMasterIdLst>
-    <p:notesMasterId r:id="rId9"/>
+    <p:notesMasterId r:id="rId8"/>
   </p:notesMasterIdLst>
   <p:sldIdLst>
     <p:sldId id="256" r:id="rId2"/>
-    <p:sldId id="257" r:id="rId3"/>
-    <p:sldId id="258" r:id="rId4"/>
-    <p:sldId id="262" r:id="rId5"/>
-    <p:sldId id="265" r:id="rId6"/>
-    <p:sldId id="259" r:id="rId7"/>
-    <p:sldId id="260" r:id="rId8"/>
+    <p:sldId id="261" r:id="rId3"/>
+    <p:sldId id="262" r:id="rId4"/>
+    <p:sldId id="263" r:id="rId5"/>
+    <p:sldId id="264" r:id="rId6"/>
+    <p:sldId id="265" r:id="rId7"/>
   </p:sldIdLst>
   <p:sldSz cx="12192000" cy="6858000"/>
   <p:notesSz cx="6858000" cy="9144000"/>
@@ -203,7 +202,7 @@
           <a:p>
             <a:fld id="{6A8E30E7-DB93-0945-82A2-CAACFA06722A}" type="datetimeFigureOut">
               <a:rPr lang="en-US" smtClean="0"/>
-              <a:t>8/4/17</a:t>
+              <a:t>8/18/17</a:t>
             </a:fld>
             <a:endParaRPr lang="en-US"/>
           </a:p>
@@ -567,90 +566,6 @@
 </p:notes>
 </file>
 
-<file path=ppt/notesSlides/notesSlide2.xml><?xml version="1.0" encoding="utf-8"?>
-<p:notes xmlns:a="http://schemas.openxmlformats.org/drawingml/2006/main" xmlns:r="http://schemas.openxmlformats.org/officeDocument/2006/relationships" xmlns:p="http://schemas.openxmlformats.org/presentationml/2006/main">
-  <p:cSld>
-    <p:spTree>
-      <p:nvGrpSpPr>
-        <p:cNvPr id="1" name=""/>
-        <p:cNvGrpSpPr/>
-        <p:nvPr/>
-      </p:nvGrpSpPr>
-      <p:grpSpPr>
-        <a:xfrm>
-          <a:off x="0" y="0"/>
-          <a:ext cx="0" cy="0"/>
-          <a:chOff x="0" y="0"/>
-          <a:chExt cx="0" cy="0"/>
-        </a:xfrm>
-      </p:grpSpPr>
-      <p:sp>
-        <p:nvSpPr>
-          <p:cNvPr id="2" name="Slide Image Placeholder 1"/>
-          <p:cNvSpPr>
-            <a:spLocks noGrp="1" noRot="1" noChangeAspect="1"/>
-          </p:cNvSpPr>
-          <p:nvPr>
-            <p:ph type="sldImg"/>
-          </p:nvPr>
-        </p:nvSpPr>
-        <p:spPr/>
-      </p:sp>
-      <p:sp>
-        <p:nvSpPr>
-          <p:cNvPr id="3" name="Notes Placeholder 2"/>
-          <p:cNvSpPr>
-            <a:spLocks noGrp="1"/>
-          </p:cNvSpPr>
-          <p:nvPr>
-            <p:ph type="body" idx="1"/>
-          </p:nvPr>
-        </p:nvSpPr>
-        <p:spPr/>
-        <p:txBody>
-          <a:bodyPr/>
-          <a:lstStyle/>
-          <a:p>
-            <a:endParaRPr lang="en-US" dirty="0"/>
-          </a:p>
-        </p:txBody>
-      </p:sp>
-      <p:sp>
-        <p:nvSpPr>
-          <p:cNvPr id="4" name="Slide Number Placeholder 3"/>
-          <p:cNvSpPr>
-            <a:spLocks noGrp="1"/>
-          </p:cNvSpPr>
-          <p:nvPr>
-            <p:ph type="sldNum" sz="quarter" idx="10"/>
-          </p:nvPr>
-        </p:nvSpPr>
-        <p:spPr/>
-        <p:txBody>
-          <a:bodyPr/>
-          <a:lstStyle/>
-          <a:p>
-            <a:fld id="{80D25C38-35EF-224E-8070-3B01C90D06CF}" type="slidenum">
-              <a:rPr lang="en-US" smtClean="0"/>
-              <a:t>6</a:t>
-            </a:fld>
-            <a:endParaRPr lang="en-US"/>
-          </a:p>
-        </p:txBody>
-      </p:sp>
-    </p:spTree>
-    <p:extLst>
-      <p:ext uri="{BB962C8B-B14F-4D97-AF65-F5344CB8AC3E}">
-        <p14:creationId xmlns:p14="http://schemas.microsoft.com/office/powerpoint/2010/main" val="334774786"/>
-      </p:ext>
-    </p:extLst>
-  </p:cSld>
-  <p:clrMapOvr>
-    <a:masterClrMapping/>
-  </p:clrMapOvr>
-</p:notes>
-</file>
-
 <file path=ppt/slideLayouts/slideLayout1.xml><?xml version="1.0" encoding="utf-8"?>
 <p:sldLayout xmlns:a="http://schemas.openxmlformats.org/drawingml/2006/main" xmlns:r="http://schemas.openxmlformats.org/officeDocument/2006/relationships" xmlns:p="http://schemas.openxmlformats.org/presentationml/2006/main" type="title" preserve="1">
   <p:cSld name="Title Slide">
@@ -782,7 +697,7 @@
           <a:p>
             <a:fld id="{DF0FB832-C4EF-5C43-B1F6-FBEA7531EFA7}" type="datetimeFigureOut">
               <a:rPr lang="en-US" smtClean="0"/>
-              <a:t>8/4/17</a:t>
+              <a:t>8/18/17</a:t>
             </a:fld>
             <a:endParaRPr lang="en-US"/>
           </a:p>
@@ -947,7 +862,7 @@
           <a:p>
             <a:fld id="{DF0FB832-C4EF-5C43-B1F6-FBEA7531EFA7}" type="datetimeFigureOut">
               <a:rPr lang="en-US" smtClean="0"/>
-              <a:t>8/4/17</a:t>
+              <a:t>8/18/17</a:t>
             </a:fld>
             <a:endParaRPr lang="en-US"/>
           </a:p>
@@ -1122,7 +1037,7 @@
           <a:p>
             <a:fld id="{DF0FB832-C4EF-5C43-B1F6-FBEA7531EFA7}" type="datetimeFigureOut">
               <a:rPr lang="en-US" smtClean="0"/>
-              <a:t>8/4/17</a:t>
+              <a:t>8/18/17</a:t>
             </a:fld>
             <a:endParaRPr lang="en-US"/>
           </a:p>
@@ -1287,7 +1202,7 @@
           <a:p>
             <a:fld id="{DF0FB832-C4EF-5C43-B1F6-FBEA7531EFA7}" type="datetimeFigureOut">
               <a:rPr lang="en-US" smtClean="0"/>
-              <a:t>8/4/17</a:t>
+              <a:t>8/18/17</a:t>
             </a:fld>
             <a:endParaRPr lang="en-US"/>
           </a:p>
@@ -1528,7 +1443,7 @@
           <a:p>
             <a:fld id="{DF0FB832-C4EF-5C43-B1F6-FBEA7531EFA7}" type="datetimeFigureOut">
               <a:rPr lang="en-US" smtClean="0"/>
-              <a:t>8/4/17</a:t>
+              <a:t>8/18/17</a:t>
             </a:fld>
             <a:endParaRPr lang="en-US"/>
           </a:p>
@@ -1755,7 +1670,7 @@
           <a:p>
             <a:fld id="{DF0FB832-C4EF-5C43-B1F6-FBEA7531EFA7}" type="datetimeFigureOut">
               <a:rPr lang="en-US" smtClean="0"/>
-              <a:t>8/4/17</a:t>
+              <a:t>8/18/17</a:t>
             </a:fld>
             <a:endParaRPr lang="en-US"/>
           </a:p>
@@ -2117,7 +2032,7 @@
           <a:p>
             <a:fld id="{DF0FB832-C4EF-5C43-B1F6-FBEA7531EFA7}" type="datetimeFigureOut">
               <a:rPr lang="en-US" smtClean="0"/>
-              <a:t>8/4/17</a:t>
+              <a:t>8/18/17</a:t>
             </a:fld>
             <a:endParaRPr lang="en-US"/>
           </a:p>
@@ -2230,7 +2145,7 @@
           <a:p>
             <a:fld id="{DF0FB832-C4EF-5C43-B1F6-FBEA7531EFA7}" type="datetimeFigureOut">
               <a:rPr lang="en-US" smtClean="0"/>
-              <a:t>8/4/17</a:t>
+              <a:t>8/18/17</a:t>
             </a:fld>
             <a:endParaRPr lang="en-US"/>
           </a:p>
@@ -2320,7 +2235,7 @@
           <a:p>
             <a:fld id="{DF0FB832-C4EF-5C43-B1F6-FBEA7531EFA7}" type="datetimeFigureOut">
               <a:rPr lang="en-US" smtClean="0"/>
-              <a:t>8/4/17</a:t>
+              <a:t>8/18/17</a:t>
             </a:fld>
             <a:endParaRPr lang="en-US"/>
           </a:p>
@@ -2592,7 +2507,7 @@
           <a:p>
             <a:fld id="{DF0FB832-C4EF-5C43-B1F6-FBEA7531EFA7}" type="datetimeFigureOut">
               <a:rPr lang="en-US" smtClean="0"/>
-              <a:t>8/4/17</a:t>
+              <a:t>8/18/17</a:t>
             </a:fld>
             <a:endParaRPr lang="en-US"/>
           </a:p>
@@ -2844,7 +2759,7 @@
           <a:p>
             <a:fld id="{DF0FB832-C4EF-5C43-B1F6-FBEA7531EFA7}" type="datetimeFigureOut">
               <a:rPr lang="en-US" smtClean="0"/>
-              <a:t>8/4/17</a:t>
+              <a:t>8/18/17</a:t>
             </a:fld>
             <a:endParaRPr lang="en-US"/>
           </a:p>
@@ -3052,7 +2967,7 @@
           <a:p>
             <a:fld id="{DF0FB832-C4EF-5C43-B1F6-FBEA7531EFA7}" type="datetimeFigureOut">
               <a:rPr lang="en-US" smtClean="0"/>
-              <a:t>8/4/17</a:t>
+              <a:t>8/18/17</a:t>
             </a:fld>
             <a:endParaRPr lang="en-US"/>
           </a:p>
@@ -3561,14 +3476,14 @@
       </p:pic>
       <p:sp>
         <p:nvSpPr>
-          <p:cNvPr id="6" name="TextBox 5"/>
+          <p:cNvPr id="7" name="TextBox 6"/>
           <p:cNvSpPr txBox="1"/>
           <p:nvPr/>
         </p:nvSpPr>
         <p:spPr>
           <a:xfrm>
-            <a:off x="2924061" y="3125242"/>
-            <a:ext cx="5998822" cy="769441"/>
+            <a:off x="0" y="5548848"/>
+            <a:ext cx="5572125" cy="1323439"/>
           </a:xfrm>
           <a:prstGeom prst="rect">
             <a:avLst/>
@@ -3576,171 +3491,223 @@
           <a:noFill/>
         </p:spPr>
         <p:txBody>
-          <a:bodyPr wrap="none" rtlCol="0">
+          <a:bodyPr wrap="square" rtlCol="0">
             <a:spAutoFit/>
           </a:bodyPr>
           <a:lstStyle/>
           <a:p>
             <a:r>
-              <a:rPr lang="en-US" sz="4400" dirty="0" smtClean="0">
+              <a:rPr lang="en-US" sz="2000" b="1" dirty="0" smtClean="0">
                 <a:solidFill>
-                  <a:srgbClr val="C00000"/>
+                  <a:srgbClr val="770000"/>
                 </a:solidFill>
-                <a:latin typeface="Cooper Black" charset="0"/>
-                <a:ea typeface="Cooper Black" charset="0"/>
-                <a:cs typeface="Cooper Black" charset="0"/>
               </a:rPr>
-              <a:t>The Rise of the Dead</a:t>
-            </a:r>
-            <a:endParaRPr lang="en-US" sz="4400" dirty="0">
+              <a:t>Created by:</a:t>
+            </a:r>
+          </a:p>
+          <a:p>
+            <a:r>
+              <a:rPr lang="en-CA" sz="2000" b="1" dirty="0" err="1" smtClean="0">
+                <a:solidFill>
+                  <a:srgbClr val="770000"/>
+                </a:solidFill>
+              </a:rPr>
+              <a:t>Haydar</a:t>
+            </a:r>
+            <a:r>
+              <a:rPr lang="en-CA" sz="2000" b="1" dirty="0" smtClean="0">
+                <a:solidFill>
+                  <a:srgbClr val="770000"/>
+                </a:solidFill>
+              </a:rPr>
+              <a:t> </a:t>
+            </a:r>
+            <a:r>
+              <a:rPr lang="en-CA" sz="2000" b="1" dirty="0" err="1">
+                <a:solidFill>
+                  <a:srgbClr val="770000"/>
+                </a:solidFill>
+              </a:rPr>
+              <a:t>S</a:t>
+            </a:r>
+            <a:r>
+              <a:rPr lang="en-CA" sz="2000" b="1" dirty="0" err="1" smtClean="0">
+                <a:solidFill>
+                  <a:srgbClr val="770000"/>
+                </a:solidFill>
+              </a:rPr>
+              <a:t>hariff</a:t>
+            </a:r>
+            <a:r>
+              <a:rPr lang="en-CA" sz="2000" b="1" dirty="0" smtClean="0">
+                <a:solidFill>
+                  <a:srgbClr val="770000"/>
+                </a:solidFill>
+              </a:rPr>
+              <a:t> </a:t>
+            </a:r>
+            <a:r>
+              <a:rPr lang="mr-IN" sz="2000" b="1" dirty="0" smtClean="0">
+                <a:solidFill>
+                  <a:srgbClr val="770000"/>
+                </a:solidFill>
+              </a:rPr>
+              <a:t>–</a:t>
+            </a:r>
+            <a:r>
+              <a:rPr lang="en-CA" sz="2000" b="1" dirty="0" smtClean="0">
+                <a:solidFill>
+                  <a:srgbClr val="770000"/>
+                </a:solidFill>
+              </a:rPr>
+              <a:t> 300 828 076</a:t>
+            </a:r>
+            <a:endParaRPr lang="en-US" sz="2000" b="1" dirty="0" smtClean="0">
               <a:solidFill>
-                <a:srgbClr val="C00000"/>
+                <a:srgbClr val="770000"/>
               </a:solidFill>
-              <a:latin typeface="Cooper Black" charset="0"/>
-              <a:ea typeface="Cooper Black" charset="0"/>
-              <a:cs typeface="Cooper Black" charset="0"/>
             </a:endParaRPr>
           </a:p>
-        </p:txBody>
-      </p:sp>
-      <p:sp>
-        <p:nvSpPr>
-          <p:cNvPr id="7" name="TextBox 6"/>
-          <p:cNvSpPr txBox="1"/>
+          <a:p>
+            <a:r>
+              <a:rPr lang="en-CA" sz="2000" b="1" dirty="0" smtClean="0">
+                <a:solidFill>
+                  <a:srgbClr val="770000"/>
+                </a:solidFill>
+              </a:rPr>
+              <a:t>Adalberto Cuevas de Paula </a:t>
+            </a:r>
+            <a:r>
+              <a:rPr lang="mr-IN" sz="2000" b="1" dirty="0" smtClean="0">
+                <a:solidFill>
+                  <a:srgbClr val="770000"/>
+                </a:solidFill>
+              </a:rPr>
+              <a:t>–</a:t>
+            </a:r>
+            <a:r>
+              <a:rPr lang="en-CA" sz="2000" b="1" dirty="0" smtClean="0">
+                <a:solidFill>
+                  <a:srgbClr val="770000"/>
+                </a:solidFill>
+              </a:rPr>
+              <a:t> 300 917 462</a:t>
+            </a:r>
+            <a:endParaRPr lang="en-US" sz="2000" b="1" dirty="0" smtClean="0">
+              <a:solidFill>
+                <a:srgbClr val="770000"/>
+              </a:solidFill>
+            </a:endParaRPr>
+          </a:p>
+          <a:p>
+            <a:r>
+              <a:rPr lang="en-CA" sz="2000" b="1" dirty="0" smtClean="0">
+                <a:solidFill>
+                  <a:srgbClr val="770000"/>
+                </a:solidFill>
+              </a:rPr>
+              <a:t>Ostap Hamarnyk - 300 836 326</a:t>
+            </a:r>
+            <a:endParaRPr lang="en-US" sz="2000" b="1" dirty="0">
+              <a:solidFill>
+                <a:srgbClr val="770000"/>
+              </a:solidFill>
+            </a:endParaRPr>
+          </a:p>
+        </p:txBody>
+      </p:sp>
+      <p:pic>
+        <p:nvPicPr>
+          <p:cNvPr id="9" name="Picture 8"/>
+          <p:cNvPicPr>
+            <a:picLocks noChangeAspect="1"/>
+          </p:cNvPicPr>
           <p:nvPr/>
-        </p:nvSpPr>
+        </p:nvPicPr>
+        <p:blipFill>
+          <a:blip r:embed="rId5">
+            <a:extLst>
+              <a:ext uri="{28A0092B-C50C-407E-A947-70E740481C1C}">
+                <a14:useLocalDpi xmlns:a14="http://schemas.microsoft.com/office/drawing/2010/main" val="0"/>
+              </a:ext>
+            </a:extLst>
+          </a:blip>
+          <a:stretch>
+            <a:fillRect/>
+          </a:stretch>
+        </p:blipFill>
         <p:spPr>
           <a:xfrm>
-            <a:off x="0" y="5185069"/>
-            <a:ext cx="5421997" cy="1569660"/>
+            <a:off x="9352953" y="3568600"/>
+            <a:ext cx="1980248" cy="1980248"/>
           </a:xfrm>
           <a:prstGeom prst="rect">
             <a:avLst/>
           </a:prstGeom>
-          <a:noFill/>
         </p:spPr>
-        <p:txBody>
-          <a:bodyPr wrap="none" rtlCol="0">
+      </p:pic>
+      <p:sp>
+        <p:nvSpPr>
+          <p:cNvPr id="10" name="TextBox 9"/>
+          <p:cNvSpPr txBox="1"/>
+          <p:nvPr/>
+        </p:nvSpPr>
+        <p:spPr>
+          <a:xfrm>
+            <a:off x="8989455" y="5729953"/>
+            <a:ext cx="2707245" cy="954107"/>
+          </a:xfrm>
+          <a:prstGeom prst="rect">
+            <a:avLst/>
+          </a:prstGeom>
+          <a:solidFill>
+            <a:srgbClr val="770000"/>
+          </a:solidFill>
+          <a:ln>
+            <a:solidFill>
+              <a:srgbClr val="770000"/>
+            </a:solidFill>
+          </a:ln>
+          <a:effectLst>
+            <a:softEdge rad="88900"/>
+          </a:effectLst>
+        </p:spPr>
+        <p:txBody>
+          <a:bodyPr wrap="square" rtlCol="0">
             <a:spAutoFit/>
           </a:bodyPr>
           <a:lstStyle/>
           <a:p>
-            <a:r>
-              <a:rPr lang="en-US" sz="2400" b="1" dirty="0" smtClean="0">
+            <a:pPr algn="ctr"/>
+            <a:r>
+              <a:rPr lang="en-US" sz="2800" smtClean="0">
                 <a:solidFill>
-                  <a:srgbClr val="C00000"/>
+                  <a:schemeClr val="bg1"/>
                 </a:solidFill>
+                <a:latin typeface="Herculanum" charset="0"/>
+                <a:ea typeface="Herculanum" charset="0"/>
+                <a:cs typeface="Herculanum" charset="0"/>
               </a:rPr>
-              <a:t>Created by:</a:t>
-            </a:r>
-          </a:p>
-          <a:p>
-            <a:r>
-              <a:rPr lang="en-CA" sz="2400" b="1" dirty="0" err="1" smtClean="0">
+              <a:t>Crazy Game </a:t>
+            </a:r>
+            <a:r>
+              <a:rPr lang="en-US" sz="2800" dirty="0" smtClean="0">
                 <a:solidFill>
-                  <a:srgbClr val="C00000"/>
+                  <a:schemeClr val="bg1"/>
                 </a:solidFill>
+                <a:latin typeface="Herculanum" charset="0"/>
+                <a:ea typeface="Herculanum" charset="0"/>
+                <a:cs typeface="Herculanum" charset="0"/>
               </a:rPr>
-              <a:t>Haydar</a:t>
-            </a:r>
-            <a:r>
-              <a:rPr lang="en-CA" sz="2400" b="1" dirty="0" smtClean="0">
-                <a:solidFill>
-                  <a:srgbClr val="C00000"/>
-                </a:solidFill>
-              </a:rPr>
-              <a:t> </a:t>
-            </a:r>
-            <a:r>
-              <a:rPr lang="en-CA" sz="2400" b="1" dirty="0" err="1">
-                <a:solidFill>
-                  <a:srgbClr val="C00000"/>
-                </a:solidFill>
-              </a:rPr>
-              <a:t>S</a:t>
-            </a:r>
-            <a:r>
-              <a:rPr lang="en-CA" sz="2400" b="1" dirty="0" err="1" smtClean="0">
-                <a:solidFill>
-                  <a:srgbClr val="C00000"/>
-                </a:solidFill>
-              </a:rPr>
-              <a:t>hariff</a:t>
-            </a:r>
-            <a:r>
-              <a:rPr lang="en-CA" sz="2400" b="1" dirty="0" smtClean="0">
-                <a:solidFill>
-                  <a:srgbClr val="C00000"/>
-                </a:solidFill>
-              </a:rPr>
-              <a:t> </a:t>
-            </a:r>
-            <a:r>
-              <a:rPr lang="mr-IN" sz="2400" b="1" dirty="0" smtClean="0">
-                <a:solidFill>
-                  <a:srgbClr val="C00000"/>
-                </a:solidFill>
-              </a:rPr>
-              <a:t>–</a:t>
-            </a:r>
-            <a:r>
-              <a:rPr lang="en-CA" sz="2400" b="1" dirty="0" smtClean="0">
-                <a:solidFill>
-                  <a:srgbClr val="C00000"/>
-                </a:solidFill>
-              </a:rPr>
-              <a:t> 300 828 076</a:t>
-            </a:r>
-            <a:endParaRPr lang="en-US" sz="2400" b="1" dirty="0" smtClean="0">
+              <a:t>Creation</a:t>
+            </a:r>
+            <a:endParaRPr lang="en-US" sz="2800" dirty="0">
               <a:solidFill>
-                <a:srgbClr val="C00000"/>
+                <a:schemeClr val="bg1"/>
               </a:solidFill>
-            </a:endParaRPr>
-          </a:p>
-          <a:p>
-            <a:r>
-              <a:rPr lang="en-CA" sz="2400" b="1" dirty="0" smtClean="0">
-                <a:solidFill>
-                  <a:srgbClr val="C00000"/>
-                </a:solidFill>
-              </a:rPr>
-              <a:t>Adalberto Cuevas de Paula </a:t>
-            </a:r>
-            <a:r>
-              <a:rPr lang="mr-IN" sz="2400" b="1" dirty="0" smtClean="0">
-                <a:solidFill>
-                  <a:srgbClr val="C00000"/>
-                </a:solidFill>
-              </a:rPr>
-              <a:t>–</a:t>
-            </a:r>
-            <a:r>
-              <a:rPr lang="en-CA" sz="2400" b="1" dirty="0" smtClean="0">
-                <a:solidFill>
-                  <a:srgbClr val="C00000"/>
-                </a:solidFill>
-              </a:rPr>
-              <a:t> 300 917 462</a:t>
-            </a:r>
-            <a:endParaRPr lang="en-US" sz="2400" b="1" dirty="0" smtClean="0">
-              <a:solidFill>
-                <a:srgbClr val="C00000"/>
-              </a:solidFill>
-            </a:endParaRPr>
-          </a:p>
-          <a:p>
-            <a:r>
-              <a:rPr lang="en-CA" sz="2400" b="1" dirty="0" smtClean="0">
-                <a:solidFill>
-                  <a:srgbClr val="C00000"/>
-                </a:solidFill>
-              </a:rPr>
-              <a:t>Ostap Hamarnyk - 300 836 326</a:t>
-            </a:r>
-            <a:endParaRPr lang="en-US" sz="2400" b="1" dirty="0">
-              <a:solidFill>
-                <a:srgbClr val="C00000"/>
-              </a:solidFill>
+              <a:latin typeface="Herculanum" charset="0"/>
+              <a:ea typeface="Herculanum" charset="0"/>
+              <a:cs typeface="Herculanum" charset="0"/>
             </a:endParaRPr>
           </a:p>
         </p:txBody>
@@ -3768,14 +3735,6 @@
 <file path=ppt/slides/slide2.xml><?xml version="1.0" encoding="utf-8"?>
 <p:sld xmlns:a="http://schemas.openxmlformats.org/drawingml/2006/main" xmlns:r="http://schemas.openxmlformats.org/officeDocument/2006/relationships" xmlns:p="http://schemas.openxmlformats.org/presentationml/2006/main">
   <p:cSld>
-    <p:bg>
-      <p:bgPr>
-        <a:solidFill>
-          <a:schemeClr val="bg1"/>
-        </a:solidFill>
-        <a:effectLst/>
-      </p:bgPr>
-    </p:bg>
     <p:spTree>
       <p:nvGrpSpPr>
         <p:cNvPr id="1" name=""/>
@@ -3790,225 +3749,145 @@
           <a:chExt cx="0" cy="0"/>
         </a:xfrm>
       </p:grpSpPr>
+      <p:sp>
+        <p:nvSpPr>
+          <p:cNvPr id="2" name="Title 1"/>
+          <p:cNvSpPr>
+            <a:spLocks noGrp="1"/>
+          </p:cNvSpPr>
+          <p:nvPr>
+            <p:ph type="title"/>
+          </p:nvPr>
+        </p:nvSpPr>
+        <p:spPr/>
+        <p:txBody>
+          <a:bodyPr>
+            <a:normAutofit/>
+          </a:bodyPr>
+          <a:lstStyle/>
+          <a:p>
+            <a:r>
+              <a:rPr lang="en-US" sz="4800" dirty="0" smtClean="0">
+                <a:solidFill>
+                  <a:srgbClr val="770000"/>
+                </a:solidFill>
+              </a:rPr>
+              <a:t>Game</a:t>
+            </a:r>
+            <a:r>
+              <a:rPr lang="en-US" sz="4800" dirty="0" smtClean="0"/>
+              <a:t> </a:t>
+            </a:r>
+            <a:r>
+              <a:rPr lang="en-US" sz="4800" dirty="0" smtClean="0">
+                <a:solidFill>
+                  <a:srgbClr val="770000"/>
+                </a:solidFill>
+              </a:rPr>
+              <a:t>Overview</a:t>
+            </a:r>
+            <a:endParaRPr lang="en-US" sz="4800" dirty="0">
+              <a:solidFill>
+                <a:srgbClr val="770000"/>
+              </a:solidFill>
+            </a:endParaRPr>
+          </a:p>
+        </p:txBody>
+      </p:sp>
       <p:pic>
         <p:nvPicPr>
-          <p:cNvPr id="4" name="Content Placeholder 3"/>
+          <p:cNvPr id="4" name="Picture 3"/>
           <p:cNvPicPr>
-            <a:picLocks noGrp="1" noChangeAspect="1"/>
+            <a:picLocks noChangeAspect="1"/>
           </p:cNvPicPr>
-          <p:nvPr>
-            <p:ph idx="1"/>
-          </p:nvPr>
+          <p:nvPr/>
         </p:nvPicPr>
         <p:blipFill>
-          <a:blip r:embed="rId2">
-            <a:extLst>
-              <a:ext uri="{28A0092B-C50C-407E-A947-70E740481C1C}">
-                <a14:useLocalDpi xmlns:a14="http://schemas.microsoft.com/office/drawing/2010/main" val="0"/>
-              </a:ext>
-            </a:extLst>
-          </a:blip>
+          <a:blip r:embed="rId2"/>
           <a:stretch>
             <a:fillRect/>
           </a:stretch>
         </p:blipFill>
         <p:spPr>
           <a:xfrm>
-            <a:off x="0" y="0"/>
-            <a:ext cx="12192000" cy="6858000"/>
-          </a:xfrm>
-        </p:spPr>
-      </p:pic>
-      <p:sp>
-        <p:nvSpPr>
-          <p:cNvPr id="2" name="Title 1"/>
-          <p:cNvSpPr>
-            <a:spLocks noGrp="1"/>
-          </p:cNvSpPr>
-          <p:nvPr>
-            <p:ph type="title"/>
-          </p:nvPr>
-        </p:nvSpPr>
-        <p:spPr/>
-        <p:txBody>
-          <a:bodyPr>
-            <a:normAutofit/>
-          </a:bodyPr>
-          <a:lstStyle/>
-          <a:p>
-            <a:pPr algn="ctr"/>
-            <a:r>
-              <a:rPr lang="en-US" sz="6000" dirty="0" smtClean="0">
-                <a:solidFill>
-                  <a:srgbClr val="E8D16D"/>
-                </a:solidFill>
-                <a:latin typeface="Franklin Gothic Heavy" charset="0"/>
-                <a:ea typeface="Franklin Gothic Heavy" charset="0"/>
-                <a:cs typeface="Franklin Gothic Heavy" charset="0"/>
-              </a:rPr>
-              <a:t>Game Story</a:t>
-            </a:r>
-            <a:endParaRPr lang="en-US" sz="6000" dirty="0">
-              <a:solidFill>
-                <a:srgbClr val="E8D16D"/>
-              </a:solidFill>
-              <a:latin typeface="Franklin Gothic Heavy" charset="0"/>
-              <a:ea typeface="Franklin Gothic Heavy" charset="0"/>
-              <a:cs typeface="Franklin Gothic Heavy" charset="0"/>
-            </a:endParaRPr>
-          </a:p>
-        </p:txBody>
-      </p:sp>
-      <p:sp>
-        <p:nvSpPr>
-          <p:cNvPr id="6" name="TextBox 5"/>
-          <p:cNvSpPr txBox="1"/>
-          <p:nvPr/>
-        </p:nvSpPr>
-        <p:spPr>
-          <a:xfrm>
-            <a:off x="1308339" y="1914976"/>
-            <a:ext cx="9575322" cy="3046988"/>
+            <a:off x="7511303" y="2237699"/>
+            <a:ext cx="4680697" cy="4620301"/>
           </a:xfrm>
           <a:prstGeom prst="rect">
             <a:avLst/>
           </a:prstGeom>
-          <a:noFill/>
         </p:spPr>
-        <p:txBody>
-          <a:bodyPr wrap="square" rtlCol="0">
-            <a:spAutoFit/>
+      </p:pic>
+      <p:sp>
+        <p:nvSpPr>
+          <p:cNvPr id="3" name="Content Placeholder 2"/>
+          <p:cNvSpPr>
+            <a:spLocks noGrp="1"/>
+          </p:cNvSpPr>
+          <p:nvPr>
+            <p:ph idx="1"/>
+          </p:nvPr>
+        </p:nvSpPr>
+        <p:spPr>
+          <a:xfrm>
+            <a:off x="285750" y="1690688"/>
+            <a:ext cx="7225553" cy="4748212"/>
+          </a:xfrm>
+        </p:spPr>
+        <p:txBody>
+          <a:bodyPr>
+            <a:noAutofit/>
           </a:bodyPr>
           <a:lstStyle/>
           <a:p>
-            <a:pPr marL="285750" indent="-285750">
-              <a:buFont typeface="Arial" charset="0"/>
-              <a:buChar char="•"/>
-            </a:pPr>
-            <a:r>
-              <a:rPr lang="en-US" sz="3200" dirty="0" smtClean="0">
-                <a:solidFill>
-                  <a:srgbClr val="D2BD62"/>
-                </a:solidFill>
-              </a:rPr>
-              <a:t>The initial idea came from </a:t>
-            </a:r>
-            <a:r>
-              <a:rPr lang="en-US" sz="3200" dirty="0" smtClean="0">
-                <a:solidFill>
-                  <a:srgbClr val="D2BD62"/>
-                </a:solidFill>
-              </a:rPr>
-              <a:t>“</a:t>
-            </a:r>
-            <a:r>
-              <a:rPr lang="en-US" sz="3200" dirty="0" smtClean="0">
-                <a:solidFill>
-                  <a:srgbClr val="D2BD62"/>
-                </a:solidFill>
-              </a:rPr>
-              <a:t>The Walking Dead”</a:t>
-            </a:r>
-          </a:p>
-          <a:p>
-            <a:pPr marL="285750" indent="-285750">
-              <a:buFont typeface="Arial" charset="0"/>
-              <a:buChar char="•"/>
-            </a:pPr>
-            <a:r>
-              <a:rPr lang="en-CA" sz="3200" dirty="0" smtClean="0">
-                <a:solidFill>
-                  <a:srgbClr val="D2BD62"/>
-                </a:solidFill>
-              </a:rPr>
-              <a:t>F</a:t>
-            </a:r>
-            <a:r>
-              <a:rPr lang="en-US" sz="3200" dirty="0" smtClean="0">
-                <a:solidFill>
-                  <a:srgbClr val="D2BD62"/>
-                </a:solidFill>
-              </a:rPr>
-              <a:t>ailed scientific experiment</a:t>
-            </a:r>
-          </a:p>
-          <a:p>
-            <a:pPr marL="285750" indent="-285750">
-              <a:buFont typeface="Arial" charset="0"/>
-              <a:buChar char="•"/>
-            </a:pPr>
-            <a:r>
-              <a:rPr lang="en-US" sz="3200" dirty="0" smtClean="0">
-                <a:solidFill>
-                  <a:srgbClr val="D2BD62"/>
-                </a:solidFill>
-              </a:rPr>
-              <a:t>“The warriors of light” </a:t>
-            </a:r>
-            <a:r>
-              <a:rPr lang="en-US" sz="3200" dirty="0" smtClean="0">
-                <a:solidFill>
-                  <a:srgbClr val="D2BD62"/>
-                </a:solidFill>
-              </a:rPr>
-              <a:t>trying </a:t>
-            </a:r>
-            <a:r>
-              <a:rPr lang="en-US" sz="3200" dirty="0" smtClean="0">
-                <a:solidFill>
-                  <a:srgbClr val="D2BD62"/>
-                </a:solidFill>
-              </a:rPr>
-              <a:t>to find the cure</a:t>
-            </a:r>
-          </a:p>
-          <a:p>
-            <a:pPr marL="285750" indent="-285750">
-              <a:buFont typeface="Arial" charset="0"/>
-              <a:buChar char="•"/>
-            </a:pPr>
-            <a:r>
-              <a:rPr lang="en-US" sz="3200" dirty="0" smtClean="0">
-                <a:solidFill>
-                  <a:srgbClr val="D2BD62"/>
-                </a:solidFill>
-              </a:rPr>
+            <a:r>
+              <a:rPr lang="en-US" sz="3200" dirty="0" smtClean="0"/>
+              <a:t>Failed </a:t>
+            </a:r>
+            <a:r>
+              <a:rPr lang="en-US" sz="3200" dirty="0"/>
+              <a:t>scientific experiment</a:t>
+            </a:r>
+          </a:p>
+          <a:p>
+            <a:r>
+              <a:rPr lang="en-US" sz="3200" dirty="0"/>
+              <a:t>“The warriors of light” trying to find the cure</a:t>
+            </a:r>
+          </a:p>
+          <a:p>
+            <a:r>
+              <a:rPr lang="en-US" sz="3200" dirty="0"/>
               <a:t>The professor from Alberta has a secret formula</a:t>
             </a:r>
           </a:p>
           <a:p>
-            <a:pPr marL="285750" indent="-285750">
-              <a:buFont typeface="Arial" charset="0"/>
-              <a:buChar char="•"/>
-            </a:pPr>
-            <a:r>
-              <a:rPr lang="en-US" sz="3200" dirty="0" smtClean="0">
-                <a:solidFill>
-                  <a:srgbClr val="D2BD62"/>
-                </a:solidFill>
-              </a:rPr>
-              <a:t>Help the Warriors to clear </a:t>
-            </a:r>
-            <a:r>
-              <a:rPr lang="en-CA" sz="3200" dirty="0" smtClean="0">
-                <a:solidFill>
-                  <a:srgbClr val="D2BD62"/>
-                </a:solidFill>
-              </a:rPr>
-              <a:t>the path to the largest security checkpoints</a:t>
-            </a:r>
-            <a:endParaRPr lang="en-US" sz="3200" dirty="0">
-              <a:solidFill>
-                <a:srgbClr val="D2BD62"/>
-              </a:solidFill>
-            </a:endParaRPr>
+            <a:r>
+              <a:rPr lang="en-US" sz="3200" dirty="0"/>
+              <a:t>Help the Warriors to clear the path to the largest security </a:t>
+            </a:r>
+            <a:r>
+              <a:rPr lang="en-US" sz="3200" dirty="0" smtClean="0"/>
+              <a:t>checkpoints</a:t>
+            </a:r>
+          </a:p>
+          <a:p>
+            <a:r>
+              <a:rPr lang="en-US" sz="3200" dirty="0"/>
+              <a:t>The initial idea came from “The Walking </a:t>
+            </a:r>
+            <a:r>
+              <a:rPr lang="en-US" sz="3200" dirty="0" smtClean="0"/>
+              <a:t>Dead”</a:t>
+            </a:r>
+            <a:endParaRPr lang="en-US" sz="3200" dirty="0"/>
           </a:p>
         </p:txBody>
       </p:sp>
     </p:spTree>
     <p:extLst>
       <p:ext uri="{BB962C8B-B14F-4D97-AF65-F5344CB8AC3E}">
-        <p14:creationId xmlns:p14="http://schemas.microsoft.com/office/powerpoint/2010/main" val="1814009694"/>
+        <p14:creationId xmlns:p14="http://schemas.microsoft.com/office/powerpoint/2010/main" val="152474049"/>
       </p:ext>
     </p:extLst>
   </p:cSld>
@@ -4054,365 +3933,68 @@
         </p:nvSpPr>
         <p:spPr/>
         <p:txBody>
-          <a:bodyPr/>
-          <a:lstStyle/>
-          <a:p>
-            <a:endParaRPr lang="en-US"/>
-          </a:p>
-        </p:txBody>
-      </p:sp>
-      <p:pic>
-        <p:nvPicPr>
-          <p:cNvPr id="4" name="Content Placeholder 3"/>
-          <p:cNvPicPr>
-            <a:picLocks noGrp="1" noChangeAspect="1"/>
-          </p:cNvPicPr>
-          <p:nvPr>
-            <p:ph idx="1"/>
-          </p:nvPr>
-        </p:nvPicPr>
-        <p:blipFill>
-          <a:blip r:embed="rId2">
-            <a:extLst>
-              <a:ext uri="{28A0092B-C50C-407E-A947-70E740481C1C}">
-                <a14:useLocalDpi xmlns:a14="http://schemas.microsoft.com/office/drawing/2010/main" val="0"/>
-              </a:ext>
-            </a:extLst>
-          </a:blip>
-          <a:stretch>
-            <a:fillRect/>
-          </a:stretch>
-        </p:blipFill>
-        <p:spPr>
-          <a:xfrm>
-            <a:off x="0" y="0"/>
-            <a:ext cx="12192000" cy="6858000"/>
-          </a:xfrm>
-        </p:spPr>
-      </p:pic>
-      <p:sp>
-        <p:nvSpPr>
-          <p:cNvPr id="5" name="Title 1"/>
-          <p:cNvSpPr txBox="1">
-            <a:spLocks/>
-          </p:cNvSpPr>
-          <p:nvPr/>
-        </p:nvSpPr>
-        <p:spPr>
-          <a:xfrm>
-            <a:off x="990600" y="517525"/>
-            <a:ext cx="10515600" cy="1325563"/>
-          </a:xfrm>
-          <a:prstGeom prst="rect">
-            <a:avLst/>
-          </a:prstGeom>
-        </p:spPr>
-        <p:txBody>
-          <a:bodyPr vert="horz" lIns="91440" tIns="45720" rIns="91440" bIns="45720" rtlCol="0" anchor="ctr">
+          <a:bodyPr>
             <a:normAutofit/>
           </a:bodyPr>
-          <a:lstStyle>
-            <a:lvl1pPr algn="l" defTabSz="914400" rtl="0" eaLnBrk="1" latinLnBrk="0" hangingPunct="1">
-              <a:lnSpc>
-                <a:spcPct val="90000"/>
-              </a:lnSpc>
-              <a:spcBef>
-                <a:spcPct val="0"/>
-              </a:spcBef>
-              <a:buNone/>
-              <a:defRPr sz="4400" kern="1200">
+          <a:lstStyle/>
+          <a:p>
+            <a:r>
+              <a:rPr lang="en-US" sz="4800" dirty="0" smtClean="0">
                 <a:solidFill>
-                  <a:schemeClr val="tx1"/>
+                  <a:srgbClr val="770000"/>
                 </a:solidFill>
-                <a:latin typeface="+mj-lt"/>
-                <a:ea typeface="+mj-ea"/>
-                <a:cs typeface="+mj-cs"/>
-              </a:defRPr>
-            </a:lvl1pPr>
-          </a:lstStyle>
-          <a:p>
-            <a:pPr algn="ctr"/>
-            <a:r>
-              <a:rPr lang="en-US" sz="6000" dirty="0" smtClean="0">
-                <a:solidFill>
-                  <a:srgbClr val="E8D16D"/>
-                </a:solidFill>
-                <a:latin typeface="Franklin Gothic Heavy" charset="0"/>
-                <a:ea typeface="Franklin Gothic Heavy" charset="0"/>
-                <a:cs typeface="Franklin Gothic Heavy" charset="0"/>
               </a:rPr>
-              <a:t>Game Details</a:t>
-            </a:r>
-            <a:endParaRPr lang="en-US" sz="6000" dirty="0">
+              <a:t>Initial Plan</a:t>
+            </a:r>
+            <a:endParaRPr lang="en-US" sz="4800" dirty="0">
               <a:solidFill>
-                <a:srgbClr val="E8D16D"/>
+                <a:srgbClr val="770000"/>
               </a:solidFill>
-              <a:latin typeface="Franklin Gothic Heavy" charset="0"/>
-              <a:ea typeface="Franklin Gothic Heavy" charset="0"/>
-              <a:cs typeface="Franklin Gothic Heavy" charset="0"/>
             </a:endParaRPr>
           </a:p>
         </p:txBody>
       </p:sp>
       <p:sp>
         <p:nvSpPr>
-          <p:cNvPr id="8" name="TextBox 7"/>
-          <p:cNvSpPr txBox="1"/>
-          <p:nvPr/>
-        </p:nvSpPr>
-        <p:spPr>
-          <a:xfrm>
-            <a:off x="1308339" y="1914976"/>
-            <a:ext cx="9575322" cy="584775"/>
-          </a:xfrm>
-          <a:prstGeom prst="rect">
-            <a:avLst/>
-          </a:prstGeom>
-          <a:noFill/>
-        </p:spPr>
-        <p:txBody>
-          <a:bodyPr wrap="square" rtlCol="0">
-            <a:spAutoFit/>
-          </a:bodyPr>
-          <a:lstStyle/>
-          <a:p>
-            <a:pPr marL="285750" marR="0" lvl="0" indent="-285750" defTabSz="914400" eaLnBrk="1" fontAlgn="auto" latinLnBrk="0" hangingPunct="1">
+          <p:cNvPr id="3" name="Content Placeholder 2"/>
+          <p:cNvSpPr>
+            <a:spLocks noGrp="1"/>
+          </p:cNvSpPr>
+          <p:nvPr>
+            <p:ph idx="1"/>
+          </p:nvPr>
+        </p:nvSpPr>
+        <p:spPr/>
+        <p:txBody>
+          <a:bodyPr/>
+          <a:lstStyle/>
+          <a:p>
+            <a:pPr>
               <a:lnSpc>
                 <a:spcPct val="100000"/>
               </a:lnSpc>
               <a:spcBef>
                 <a:spcPts val="0"/>
               </a:spcBef>
-              <a:spcAft>
-                <a:spcPts val="0"/>
-              </a:spcAft>
-              <a:buClrTx/>
-              <a:buSzTx/>
-              <a:buFont typeface="Arial" charset="0"/>
-              <a:buNone/>
-              <a:tabLst/>
-              <a:defRPr/>
             </a:pPr>
             <a:r>
-              <a:rPr lang="en-US" sz="3200" dirty="0" smtClean="0">
-                <a:solidFill>
-                  <a:srgbClr val="D2BD62"/>
-                </a:solidFill>
-              </a:rPr>
-              <a:t>Game Characters</a:t>
-            </a:r>
-            <a:endParaRPr lang="en-US" sz="3200" dirty="0">
-              <a:solidFill>
-                <a:srgbClr val="D2BD62"/>
-              </a:solidFill>
-            </a:endParaRPr>
-          </a:p>
-        </p:txBody>
-      </p:sp>
-      <p:sp>
-        <p:nvSpPr>
-          <p:cNvPr id="9" name="TextBox 8"/>
-          <p:cNvSpPr txBox="1"/>
-          <p:nvPr/>
-        </p:nvSpPr>
-        <p:spPr>
-          <a:xfrm>
-            <a:off x="1308339" y="2571639"/>
-            <a:ext cx="9302152" cy="3539430"/>
-          </a:xfrm>
-          <a:prstGeom prst="rect">
-            <a:avLst/>
-          </a:prstGeom>
-          <a:noFill/>
-        </p:spPr>
-        <p:txBody>
-          <a:bodyPr wrap="square" rtlCol="0">
-            <a:spAutoFit/>
-          </a:bodyPr>
-          <a:lstStyle/>
-          <a:p>
-            <a:pPr marL="285750" indent="-285750">
-              <a:buFont typeface="Arial" charset="0"/>
-              <a:buChar char="•"/>
-            </a:pPr>
-            <a:r>
-              <a:rPr lang="en-US" sz="3200" dirty="0" smtClean="0">
-                <a:solidFill>
-                  <a:srgbClr val="D2BD62"/>
-                </a:solidFill>
-              </a:rPr>
-              <a:t>8 types of regular zombies</a:t>
-            </a:r>
-          </a:p>
-          <a:p>
-            <a:pPr marL="742950" lvl="1" indent="-285750">
-              <a:buFont typeface="Arial" charset="0"/>
-              <a:buChar char="•"/>
-            </a:pPr>
-            <a:r>
-              <a:rPr lang="en-US" sz="3200" dirty="0" smtClean="0">
-                <a:solidFill>
-                  <a:srgbClr val="D2BD62"/>
-                </a:solidFill>
-              </a:rPr>
-              <a:t>2 types of easy difficulty</a:t>
-            </a:r>
-          </a:p>
-          <a:p>
-            <a:pPr marL="742950" lvl="1" indent="-285750">
-              <a:buFont typeface="Arial" charset="0"/>
-              <a:buChar char="•"/>
-            </a:pPr>
-            <a:r>
-              <a:rPr lang="en-US" sz="3200" dirty="0" smtClean="0">
-                <a:solidFill>
-                  <a:srgbClr val="D2BD62"/>
-                </a:solidFill>
-              </a:rPr>
-              <a:t>2 types of medium difficulty </a:t>
-            </a:r>
-          </a:p>
-          <a:p>
-            <a:pPr marL="742950" lvl="1" indent="-285750">
-              <a:buFont typeface="Arial" charset="0"/>
-              <a:buChar char="•"/>
-            </a:pPr>
-            <a:r>
-              <a:rPr lang="en-US" sz="3200" dirty="0" smtClean="0">
-                <a:solidFill>
-                  <a:srgbClr val="D2BD62"/>
-                </a:solidFill>
-              </a:rPr>
-              <a:t>3 types of hard difficulty</a:t>
-            </a:r>
-          </a:p>
-          <a:p>
-            <a:pPr marL="285750" indent="-285750">
-              <a:buFont typeface="Arial" charset="0"/>
-              <a:buChar char="•"/>
-            </a:pPr>
-            <a:r>
-              <a:rPr lang="en-US" sz="3200" dirty="0" smtClean="0">
-                <a:solidFill>
-                  <a:srgbClr val="D2BD62"/>
-                </a:solidFill>
-              </a:rPr>
-              <a:t>3 types of boss zombies</a:t>
-            </a:r>
-          </a:p>
-          <a:p>
-            <a:pPr marL="742950" lvl="1" indent="-285750">
-              <a:buFont typeface="Arial" charset="0"/>
-              <a:buChar char="•"/>
-            </a:pPr>
-            <a:endParaRPr lang="en-CA" sz="3200" dirty="0" smtClean="0">
-              <a:solidFill>
-                <a:srgbClr val="D2BD62"/>
-              </a:solidFill>
-            </a:endParaRPr>
-          </a:p>
-          <a:p>
-            <a:pPr marL="285750" indent="-285750">
-              <a:buFont typeface="Arial" charset="0"/>
-              <a:buChar char="•"/>
-            </a:pPr>
-            <a:endParaRPr lang="en-US" sz="3200" dirty="0">
-              <a:solidFill>
-                <a:srgbClr val="D2BD62"/>
-              </a:solidFill>
-            </a:endParaRPr>
-          </a:p>
-        </p:txBody>
-      </p:sp>
-      <p:pic>
-        <p:nvPicPr>
-          <p:cNvPr id="3" name="Picture 2"/>
-          <p:cNvPicPr>
-            <a:picLocks noChangeAspect="1"/>
-          </p:cNvPicPr>
-          <p:nvPr/>
-        </p:nvPicPr>
-        <p:blipFill>
-          <a:blip r:embed="rId3"/>
-          <a:stretch>
-            <a:fillRect/>
-          </a:stretch>
-        </p:blipFill>
-        <p:spPr>
-          <a:xfrm>
-            <a:off x="7170760" y="2055813"/>
-            <a:ext cx="3439731" cy="1084263"/>
-          </a:xfrm>
-          <a:prstGeom prst="rect">
-            <a:avLst/>
-          </a:prstGeom>
-        </p:spPr>
-      </p:pic>
-      <p:pic>
-        <p:nvPicPr>
-          <p:cNvPr id="6" name="Picture 5"/>
-          <p:cNvPicPr>
-            <a:picLocks noChangeAspect="1"/>
-          </p:cNvPicPr>
-          <p:nvPr/>
-        </p:nvPicPr>
-        <p:blipFill>
-          <a:blip r:embed="rId4"/>
-          <a:stretch>
-            <a:fillRect/>
-          </a:stretch>
-        </p:blipFill>
-        <p:spPr>
-          <a:xfrm>
-            <a:off x="7353923" y="3282156"/>
-            <a:ext cx="3215355" cy="1132682"/>
-          </a:xfrm>
-          <a:prstGeom prst="rect">
-            <a:avLst/>
-          </a:prstGeom>
-        </p:spPr>
-      </p:pic>
-      <p:pic>
-        <p:nvPicPr>
-          <p:cNvPr id="7" name="Picture 6"/>
-          <p:cNvPicPr>
-            <a:picLocks noChangeAspect="1"/>
-          </p:cNvPicPr>
-          <p:nvPr/>
-        </p:nvPicPr>
-        <p:blipFill>
-          <a:blip r:embed="rId5"/>
-          <a:stretch>
-            <a:fillRect/>
-          </a:stretch>
-        </p:blipFill>
-        <p:spPr>
-          <a:xfrm>
-            <a:off x="7233779" y="4668434"/>
-            <a:ext cx="3455642" cy="1189038"/>
-          </a:xfrm>
-          <a:prstGeom prst="rect">
-            <a:avLst/>
-          </a:prstGeom>
-        </p:spPr>
-      </p:pic>
+              <a:rPr lang="en-US" dirty="0" smtClean="0"/>
+              <a:t>List of all classes and </a:t>
+            </a:r>
+            <a:endParaRPr lang="en-US" dirty="0"/>
+          </a:p>
+        </p:txBody>
+      </p:sp>
     </p:spTree>
     <p:extLst>
       <p:ext uri="{BB962C8B-B14F-4D97-AF65-F5344CB8AC3E}">
-        <p14:creationId xmlns:p14="http://schemas.microsoft.com/office/powerpoint/2010/main" val="734146365"/>
+        <p14:creationId xmlns:p14="http://schemas.microsoft.com/office/powerpoint/2010/main" val="914480722"/>
       </p:ext>
     </p:extLst>
   </p:cSld>
   <p:clrMapOvr>
     <a:masterClrMapping/>
   </p:clrMapOvr>
-  <p:timing>
-    <p:tnLst>
-      <p:par>
-        <p:cTn id="1" dur="indefinite" restart="never" nodeType="tmRoot"/>
-      </p:par>
-    </p:tnLst>
-  </p:timing>
 </p:sld>
 </file>
 
@@ -4445,350 +4027,133 @@
         </p:nvSpPr>
         <p:spPr/>
         <p:txBody>
-          <a:bodyPr/>
-          <a:lstStyle/>
-          <a:p>
-            <a:endParaRPr lang="en-US"/>
+          <a:bodyPr>
+            <a:normAutofit/>
+          </a:bodyPr>
+          <a:lstStyle/>
+          <a:p>
+            <a:r>
+              <a:rPr lang="en-US" sz="4800" dirty="0" smtClean="0">
+                <a:solidFill>
+                  <a:srgbClr val="770000"/>
+                </a:solidFill>
+              </a:rPr>
+              <a:t>Game</a:t>
+            </a:r>
+            <a:r>
+              <a:rPr lang="en-US" sz="4800" dirty="0" smtClean="0"/>
+              <a:t> </a:t>
+            </a:r>
+            <a:r>
+              <a:rPr lang="en-US" sz="4800" dirty="0" smtClean="0">
+                <a:solidFill>
+                  <a:srgbClr val="770000"/>
+                </a:solidFill>
+              </a:rPr>
+              <a:t>Story</a:t>
+            </a:r>
+            <a:endParaRPr lang="en-US" sz="4800" dirty="0">
+              <a:solidFill>
+                <a:srgbClr val="770000"/>
+              </a:solidFill>
+            </a:endParaRPr>
           </a:p>
         </p:txBody>
       </p:sp>
       <p:pic>
         <p:nvPicPr>
-          <p:cNvPr id="4" name="Content Placeholder 3"/>
+          <p:cNvPr id="4" name="Picture 3"/>
           <p:cNvPicPr>
-            <a:picLocks noGrp="1" noChangeAspect="1"/>
+            <a:picLocks noChangeAspect="1"/>
           </p:cNvPicPr>
-          <p:nvPr>
-            <p:ph idx="1"/>
-          </p:nvPr>
+          <p:nvPr/>
         </p:nvPicPr>
         <p:blipFill>
-          <a:blip r:embed="rId2">
-            <a:extLst>
-              <a:ext uri="{28A0092B-C50C-407E-A947-70E740481C1C}">
-                <a14:useLocalDpi xmlns:a14="http://schemas.microsoft.com/office/drawing/2010/main" val="0"/>
-              </a:ext>
-            </a:extLst>
-          </a:blip>
+          <a:blip r:embed="rId2"/>
           <a:stretch>
             <a:fillRect/>
           </a:stretch>
         </p:blipFill>
         <p:spPr>
           <a:xfrm>
-            <a:off x="0" y="0"/>
-            <a:ext cx="12192000" cy="6858000"/>
-          </a:xfrm>
-        </p:spPr>
-      </p:pic>
-      <p:sp>
-        <p:nvSpPr>
-          <p:cNvPr id="5" name="Title 1"/>
-          <p:cNvSpPr txBox="1">
-            <a:spLocks/>
-          </p:cNvSpPr>
-          <p:nvPr/>
-        </p:nvSpPr>
-        <p:spPr>
-          <a:xfrm>
-            <a:off x="990600" y="517525"/>
-            <a:ext cx="10515600" cy="1325563"/>
-          </a:xfrm>
-          <a:prstGeom prst="rect">
-            <a:avLst/>
-          </a:prstGeom>
-        </p:spPr>
-        <p:txBody>
-          <a:bodyPr vert="horz" lIns="91440" tIns="45720" rIns="91440" bIns="45720" rtlCol="0" anchor="ctr">
-            <a:normAutofit/>
-          </a:bodyPr>
-          <a:lstStyle>
-            <a:lvl1pPr algn="l" defTabSz="914400" rtl="0" eaLnBrk="1" latinLnBrk="0" hangingPunct="1">
-              <a:lnSpc>
-                <a:spcPct val="90000"/>
-              </a:lnSpc>
-              <a:spcBef>
-                <a:spcPct val="0"/>
-              </a:spcBef>
-              <a:buNone/>
-              <a:defRPr sz="4400" kern="1200">
-                <a:solidFill>
-                  <a:schemeClr val="tx1"/>
-                </a:solidFill>
-                <a:latin typeface="+mj-lt"/>
-                <a:ea typeface="+mj-ea"/>
-                <a:cs typeface="+mj-cs"/>
-              </a:defRPr>
-            </a:lvl1pPr>
-          </a:lstStyle>
-          <a:p>
-            <a:pPr algn="ctr"/>
-            <a:r>
-              <a:rPr lang="en-US" sz="6000" dirty="0" smtClean="0">
-                <a:solidFill>
-                  <a:srgbClr val="E8D16D"/>
-                </a:solidFill>
-                <a:latin typeface="Franklin Gothic Heavy" charset="0"/>
-                <a:ea typeface="Franklin Gothic Heavy" charset="0"/>
-                <a:cs typeface="Franklin Gothic Heavy" charset="0"/>
-              </a:rPr>
-              <a:t>Game Details</a:t>
-            </a:r>
-            <a:endParaRPr lang="en-US" sz="6000" dirty="0">
-              <a:solidFill>
-                <a:srgbClr val="E8D16D"/>
-              </a:solidFill>
-              <a:latin typeface="Franklin Gothic Heavy" charset="0"/>
-              <a:ea typeface="Franklin Gothic Heavy" charset="0"/>
-              <a:cs typeface="Franklin Gothic Heavy" charset="0"/>
-            </a:endParaRPr>
-          </a:p>
-        </p:txBody>
-      </p:sp>
-      <p:sp>
-        <p:nvSpPr>
-          <p:cNvPr id="6" name="TextBox 5"/>
-          <p:cNvSpPr txBox="1"/>
-          <p:nvPr/>
-        </p:nvSpPr>
-        <p:spPr>
-          <a:xfrm>
-            <a:off x="1308339" y="1914976"/>
-            <a:ext cx="9575322" cy="584775"/>
-          </a:xfrm>
-          <a:prstGeom prst="rect">
-            <a:avLst/>
-          </a:prstGeom>
-          <a:noFill/>
-        </p:spPr>
-        <p:txBody>
-          <a:bodyPr wrap="square" rtlCol="0">
-            <a:spAutoFit/>
-          </a:bodyPr>
-          <a:lstStyle/>
-          <a:p>
-            <a:pPr marL="285750" marR="0" lvl="0" indent="-285750" defTabSz="914400" eaLnBrk="1" fontAlgn="auto" latinLnBrk="0" hangingPunct="1">
-              <a:lnSpc>
-                <a:spcPct val="100000"/>
-              </a:lnSpc>
-              <a:spcBef>
-                <a:spcPts val="0"/>
-              </a:spcBef>
-              <a:spcAft>
-                <a:spcPts val="0"/>
-              </a:spcAft>
-              <a:buClrTx/>
-              <a:buSzTx/>
-              <a:buFont typeface="Arial" charset="0"/>
-              <a:buNone/>
-              <a:tabLst/>
-              <a:defRPr/>
-            </a:pPr>
-            <a:r>
-              <a:rPr lang="en-US" sz="3200" dirty="0" smtClean="0">
-                <a:solidFill>
-                  <a:srgbClr val="D2BD62"/>
-                </a:solidFill>
-              </a:rPr>
-              <a:t>Game Weapons</a:t>
-            </a:r>
-            <a:endParaRPr lang="en-US" sz="3200" dirty="0">
-              <a:solidFill>
-                <a:srgbClr val="D2BD62"/>
-              </a:solidFill>
-            </a:endParaRPr>
-          </a:p>
-        </p:txBody>
-      </p:sp>
-      <p:sp>
-        <p:nvSpPr>
-          <p:cNvPr id="7" name="TextBox 6"/>
-          <p:cNvSpPr txBox="1"/>
-          <p:nvPr/>
-        </p:nvSpPr>
-        <p:spPr>
-          <a:xfrm>
-            <a:off x="1308339" y="2571639"/>
-            <a:ext cx="9302152" cy="2062103"/>
-          </a:xfrm>
-          <a:prstGeom prst="rect">
-            <a:avLst/>
-          </a:prstGeom>
-          <a:noFill/>
-        </p:spPr>
-        <p:txBody>
-          <a:bodyPr wrap="square" rtlCol="0">
-            <a:spAutoFit/>
-          </a:bodyPr>
-          <a:lstStyle/>
-          <a:p>
-            <a:pPr marL="285750" indent="-285750">
-              <a:buFont typeface="Arial" charset="0"/>
-              <a:buChar char="•"/>
-            </a:pPr>
-            <a:r>
-              <a:rPr lang="en-US" sz="3200" dirty="0" smtClean="0">
-                <a:solidFill>
-                  <a:srgbClr val="D2BD62"/>
-                </a:solidFill>
-              </a:rPr>
-              <a:t>4 types of turrets to kill zombies</a:t>
-            </a:r>
-          </a:p>
-          <a:p>
-            <a:pPr marL="285750" indent="-285750">
-              <a:buFont typeface="Arial" charset="0"/>
-              <a:buChar char="•"/>
-            </a:pPr>
-            <a:r>
-              <a:rPr lang="en-US" sz="3200" dirty="0" smtClean="0">
-                <a:solidFill>
-                  <a:srgbClr val="D2BD62"/>
-                </a:solidFill>
-              </a:rPr>
-              <a:t>Each tower </a:t>
-            </a:r>
-            <a:r>
-              <a:rPr lang="en-US" sz="3200" smtClean="0">
-                <a:solidFill>
-                  <a:srgbClr val="D2BD62"/>
-                </a:solidFill>
-              </a:rPr>
-              <a:t>can </a:t>
-            </a:r>
-            <a:r>
-              <a:rPr lang="en-US" sz="3200" smtClean="0">
-                <a:solidFill>
-                  <a:srgbClr val="D2BD62"/>
-                </a:solidFill>
-              </a:rPr>
-              <a:t>upgrade up </a:t>
-            </a:r>
-            <a:r>
-              <a:rPr lang="en-US" sz="3200" dirty="0" smtClean="0">
-                <a:solidFill>
-                  <a:srgbClr val="D2BD62"/>
-                </a:solidFill>
-              </a:rPr>
-              <a:t>to 3</a:t>
-            </a:r>
-            <a:r>
-              <a:rPr lang="en-US" sz="3200" baseline="30000" dirty="0" smtClean="0">
-                <a:solidFill>
-                  <a:srgbClr val="D2BD62"/>
-                </a:solidFill>
-              </a:rPr>
-              <a:t>rd</a:t>
-            </a:r>
-            <a:r>
-              <a:rPr lang="en-US" sz="3200" dirty="0" smtClean="0">
-                <a:solidFill>
-                  <a:srgbClr val="D2BD62"/>
-                </a:solidFill>
-              </a:rPr>
-              <a:t> level</a:t>
-            </a:r>
-          </a:p>
-          <a:p>
-            <a:pPr marL="742950" lvl="1" indent="-285750">
-              <a:buFont typeface="Arial" charset="0"/>
-              <a:buChar char="•"/>
-            </a:pPr>
-            <a:endParaRPr lang="en-CA" sz="3200" dirty="0" smtClean="0">
-              <a:solidFill>
-                <a:srgbClr val="D2BD62"/>
-              </a:solidFill>
-            </a:endParaRPr>
-          </a:p>
-          <a:p>
-            <a:pPr marL="285750" indent="-285750">
-              <a:buFont typeface="Arial" charset="0"/>
-              <a:buChar char="•"/>
-            </a:pPr>
-            <a:endParaRPr lang="en-US" sz="3200" dirty="0">
-              <a:solidFill>
-                <a:srgbClr val="D2BD62"/>
-              </a:solidFill>
-            </a:endParaRPr>
-          </a:p>
-        </p:txBody>
-      </p:sp>
-      <p:pic>
-        <p:nvPicPr>
-          <p:cNvPr id="3" name="Picture 2"/>
-          <p:cNvPicPr>
-            <a:picLocks noChangeAspect="1"/>
-          </p:cNvPicPr>
-          <p:nvPr/>
-        </p:nvPicPr>
-        <p:blipFill>
-          <a:blip r:embed="rId3"/>
-          <a:stretch>
-            <a:fillRect/>
-          </a:stretch>
-        </p:blipFill>
-        <p:spPr>
-          <a:xfrm>
-            <a:off x="9078673" y="2055813"/>
-            <a:ext cx="1457325" cy="4308613"/>
+            <a:off x="7511303" y="2237699"/>
+            <a:ext cx="4680697" cy="4620301"/>
           </a:xfrm>
           <a:prstGeom prst="rect">
             <a:avLst/>
           </a:prstGeom>
         </p:spPr>
       </p:pic>
-      <p:pic>
-        <p:nvPicPr>
-          <p:cNvPr id="10" name="Picture 9"/>
-          <p:cNvPicPr>
-            <a:picLocks noChangeAspect="1"/>
-          </p:cNvPicPr>
-          <p:nvPr/>
-        </p:nvPicPr>
-        <p:blipFill>
-          <a:blip r:embed="rId4"/>
-          <a:stretch>
-            <a:fillRect/>
-          </a:stretch>
-        </p:blipFill>
+      <p:sp>
+        <p:nvSpPr>
+          <p:cNvPr id="3" name="Content Placeholder 2"/>
+          <p:cNvSpPr>
+            <a:spLocks noGrp="1"/>
+          </p:cNvSpPr>
+          <p:nvPr>
+            <p:ph idx="1"/>
+          </p:nvPr>
+        </p:nvSpPr>
         <p:spPr>
-          <a:xfrm rot="5400000">
-            <a:off x="4040621" y="2395538"/>
-            <a:ext cx="1252538" cy="3757613"/>
+          <a:xfrm>
+            <a:off x="285750" y="1690688"/>
+            <a:ext cx="7225553" cy="4748212"/>
           </a:xfrm>
-          <a:prstGeom prst="rect">
-            <a:avLst/>
-          </a:prstGeom>
         </p:spPr>
-      </p:pic>
-      <p:pic>
-        <p:nvPicPr>
-          <p:cNvPr id="11" name="Picture 10"/>
-          <p:cNvPicPr>
-            <a:picLocks noChangeAspect="1"/>
-          </p:cNvPicPr>
-          <p:nvPr/>
-        </p:nvPicPr>
-        <p:blipFill>
-          <a:blip r:embed="rId5"/>
-          <a:stretch>
-            <a:fillRect/>
-          </a:stretch>
-        </p:blipFill>
-        <p:spPr>
-          <a:xfrm rot="5400000">
-            <a:off x="4138794" y="3673009"/>
-            <a:ext cx="1338542" cy="4117031"/>
-          </a:xfrm>
-          <a:prstGeom prst="rect">
-            <a:avLst/>
-          </a:prstGeom>
-        </p:spPr>
-      </p:pic>
+        <p:txBody>
+          <a:bodyPr>
+            <a:noAutofit/>
+          </a:bodyPr>
+          <a:lstStyle/>
+          <a:p>
+            <a:r>
+              <a:rPr lang="en-US" sz="3200" dirty="0" smtClean="0"/>
+              <a:t>Failed </a:t>
+            </a:r>
+            <a:r>
+              <a:rPr lang="en-US" sz="3200" dirty="0"/>
+              <a:t>scientific experiment</a:t>
+            </a:r>
+          </a:p>
+          <a:p>
+            <a:r>
+              <a:rPr lang="en-US" sz="3200" dirty="0"/>
+              <a:t>“The warriors of light” trying to find the cure</a:t>
+            </a:r>
+          </a:p>
+          <a:p>
+            <a:r>
+              <a:rPr lang="en-US" sz="3200" dirty="0"/>
+              <a:t>The professor from Alberta has a secret formula</a:t>
+            </a:r>
+          </a:p>
+          <a:p>
+            <a:r>
+              <a:rPr lang="en-US" sz="3200" dirty="0"/>
+              <a:t>Help the Warriors to clear the path to the largest security </a:t>
+            </a:r>
+            <a:r>
+              <a:rPr lang="en-US" sz="3200" dirty="0" smtClean="0"/>
+              <a:t>checkpoints</a:t>
+            </a:r>
+          </a:p>
+          <a:p>
+            <a:r>
+              <a:rPr lang="en-US" sz="3200" dirty="0"/>
+              <a:t>The initial idea came from “The Walking </a:t>
+            </a:r>
+            <a:r>
+              <a:rPr lang="en-US" sz="3200" dirty="0" smtClean="0"/>
+              <a:t>Dead”</a:t>
+            </a:r>
+            <a:endParaRPr lang="en-US" sz="3200" dirty="0"/>
+          </a:p>
+        </p:txBody>
+      </p:sp>
     </p:spTree>
     <p:extLst>
       <p:ext uri="{BB962C8B-B14F-4D97-AF65-F5344CB8AC3E}">
-        <p14:creationId xmlns:p14="http://schemas.microsoft.com/office/powerpoint/2010/main" val="3867823"/>
+        <p14:creationId xmlns:p14="http://schemas.microsoft.com/office/powerpoint/2010/main" val="137033075"/>
       </p:ext>
     </p:extLst>
   </p:cSld>
@@ -4822,276 +4187,145 @@
           <a:chExt cx="0" cy="0"/>
         </a:xfrm>
       </p:grpSpPr>
+      <p:sp>
+        <p:nvSpPr>
+          <p:cNvPr id="2" name="Title 1"/>
+          <p:cNvSpPr>
+            <a:spLocks noGrp="1"/>
+          </p:cNvSpPr>
+          <p:nvPr>
+            <p:ph type="title"/>
+          </p:nvPr>
+        </p:nvSpPr>
+        <p:spPr/>
+        <p:txBody>
+          <a:bodyPr>
+            <a:normAutofit/>
+          </a:bodyPr>
+          <a:lstStyle/>
+          <a:p>
+            <a:r>
+              <a:rPr lang="en-US" sz="4800" dirty="0" smtClean="0">
+                <a:solidFill>
+                  <a:srgbClr val="770000"/>
+                </a:solidFill>
+              </a:rPr>
+              <a:t>Game</a:t>
+            </a:r>
+            <a:r>
+              <a:rPr lang="en-US" sz="4800" dirty="0" smtClean="0"/>
+              <a:t> </a:t>
+            </a:r>
+            <a:r>
+              <a:rPr lang="en-US" sz="4800" dirty="0" smtClean="0">
+                <a:solidFill>
+                  <a:srgbClr val="770000"/>
+                </a:solidFill>
+              </a:rPr>
+              <a:t>Story</a:t>
+            </a:r>
+            <a:endParaRPr lang="en-US" sz="4800" dirty="0">
+              <a:solidFill>
+                <a:srgbClr val="770000"/>
+              </a:solidFill>
+            </a:endParaRPr>
+          </a:p>
+        </p:txBody>
+      </p:sp>
       <p:pic>
         <p:nvPicPr>
-          <p:cNvPr id="4" name="Content Placeholder 3"/>
+          <p:cNvPr id="4" name="Picture 3"/>
           <p:cNvPicPr>
-            <a:picLocks noGrp="1" noChangeAspect="1"/>
+            <a:picLocks noChangeAspect="1"/>
           </p:cNvPicPr>
-          <p:nvPr>
-            <p:ph idx="1"/>
-          </p:nvPr>
+          <p:nvPr/>
         </p:nvPicPr>
         <p:blipFill>
-          <a:blip r:embed="rId2">
-            <a:extLst>
-              <a:ext uri="{28A0092B-C50C-407E-A947-70E740481C1C}">
-                <a14:useLocalDpi xmlns:a14="http://schemas.microsoft.com/office/drawing/2010/main" val="0"/>
-              </a:ext>
-            </a:extLst>
-          </a:blip>
+          <a:blip r:embed="rId2"/>
           <a:stretch>
             <a:fillRect/>
           </a:stretch>
         </p:blipFill>
         <p:spPr>
           <a:xfrm>
-            <a:off x="0" y="0"/>
-            <a:ext cx="12192000" cy="6858000"/>
-          </a:xfrm>
-        </p:spPr>
-      </p:pic>
-      <p:sp>
-        <p:nvSpPr>
-          <p:cNvPr id="2" name="Title 1"/>
-          <p:cNvSpPr>
-            <a:spLocks noGrp="1"/>
-          </p:cNvSpPr>
-          <p:nvPr>
-            <p:ph type="title"/>
-          </p:nvPr>
-        </p:nvSpPr>
-        <p:spPr/>
-        <p:txBody>
-          <a:bodyPr>
-            <a:normAutofit/>
-          </a:bodyPr>
-          <a:lstStyle/>
-          <a:p>
-            <a:pPr algn="ctr"/>
-            <a:r>
-              <a:rPr lang="en-US" sz="6000" dirty="0" smtClean="0">
-                <a:solidFill>
-                  <a:srgbClr val="E8D16D"/>
-                </a:solidFill>
-                <a:latin typeface="Franklin Gothic Heavy" charset="0"/>
-                <a:ea typeface="Franklin Gothic Heavy" charset="0"/>
-                <a:cs typeface="Franklin Gothic Heavy" charset="0"/>
-              </a:rPr>
-              <a:t>Game </a:t>
-            </a:r>
-            <a:r>
-              <a:rPr lang="en-CA" sz="6000" dirty="0" smtClean="0">
-                <a:solidFill>
-                  <a:srgbClr val="E8D16D"/>
-                </a:solidFill>
-                <a:latin typeface="Franklin Gothic Heavy" charset="0"/>
-                <a:ea typeface="Franklin Gothic Heavy" charset="0"/>
-                <a:cs typeface="Franklin Gothic Heavy" charset="0"/>
-              </a:rPr>
-              <a:t>Details</a:t>
-            </a:r>
-            <a:endParaRPr lang="en-US" sz="6000" dirty="0">
-              <a:solidFill>
-                <a:srgbClr val="E8D16D"/>
-              </a:solidFill>
-              <a:latin typeface="Franklin Gothic Heavy" charset="0"/>
-              <a:ea typeface="Franklin Gothic Heavy" charset="0"/>
-              <a:cs typeface="Franklin Gothic Heavy" charset="0"/>
-            </a:endParaRPr>
-          </a:p>
-        </p:txBody>
-      </p:sp>
-      <p:sp>
-        <p:nvSpPr>
-          <p:cNvPr id="5" name="TextBox 4"/>
-          <p:cNvSpPr txBox="1"/>
-          <p:nvPr/>
-        </p:nvSpPr>
-        <p:spPr>
-          <a:xfrm>
-            <a:off x="1308339" y="1740438"/>
-            <a:ext cx="9575322" cy="584775"/>
-          </a:xfrm>
-          <a:prstGeom prst="rect">
-            <a:avLst/>
-          </a:prstGeom>
-          <a:noFill/>
-        </p:spPr>
-        <p:txBody>
-          <a:bodyPr wrap="square" rtlCol="0">
-            <a:spAutoFit/>
-          </a:bodyPr>
-          <a:lstStyle/>
-          <a:p>
-            <a:pPr marL="285750" marR="0" lvl="0" indent="-285750" defTabSz="914400" eaLnBrk="1" fontAlgn="auto" latinLnBrk="0" hangingPunct="1">
-              <a:lnSpc>
-                <a:spcPct val="100000"/>
-              </a:lnSpc>
-              <a:spcBef>
-                <a:spcPts val="0"/>
-              </a:spcBef>
-              <a:spcAft>
-                <a:spcPts val="0"/>
-              </a:spcAft>
-              <a:buClrTx/>
-              <a:buSzTx/>
-              <a:buFont typeface="Arial" charset="0"/>
-              <a:buNone/>
-              <a:tabLst/>
-              <a:defRPr/>
-            </a:pPr>
-            <a:r>
-              <a:rPr lang="en-US" sz="3200" dirty="0" smtClean="0">
-                <a:solidFill>
-                  <a:srgbClr val="D2BD62"/>
-                </a:solidFill>
-              </a:rPr>
-              <a:t>Game Maps</a:t>
-            </a:r>
-            <a:endParaRPr lang="en-US" sz="3200" dirty="0">
-              <a:solidFill>
-                <a:srgbClr val="D2BD62"/>
-              </a:solidFill>
-            </a:endParaRPr>
-          </a:p>
-        </p:txBody>
-      </p:sp>
-      <p:sp>
-        <p:nvSpPr>
-          <p:cNvPr id="7" name="TextBox 6"/>
-          <p:cNvSpPr txBox="1"/>
-          <p:nvPr/>
-        </p:nvSpPr>
-        <p:spPr>
-          <a:xfrm>
-            <a:off x="1308339" y="2179921"/>
-            <a:ext cx="9302152" cy="3046988"/>
-          </a:xfrm>
-          <a:prstGeom prst="rect">
-            <a:avLst/>
-          </a:prstGeom>
-          <a:noFill/>
-        </p:spPr>
-        <p:txBody>
-          <a:bodyPr wrap="square" rtlCol="0">
-            <a:spAutoFit/>
-          </a:bodyPr>
-          <a:lstStyle/>
-          <a:p>
-            <a:pPr marL="285750" indent="-285750">
-              <a:buFont typeface="Arial" charset="0"/>
-              <a:buChar char="•"/>
-            </a:pPr>
-            <a:r>
-              <a:rPr lang="en-US" sz="3200" dirty="0" smtClean="0">
-                <a:solidFill>
-                  <a:srgbClr val="D2BD62"/>
-                </a:solidFill>
-              </a:rPr>
-              <a:t>4 types of maps in different environment</a:t>
-            </a:r>
-          </a:p>
-          <a:p>
-            <a:pPr marL="742950" lvl="1" indent="-285750">
-              <a:buFont typeface="Arial" charset="0"/>
-              <a:buChar char="•"/>
-            </a:pPr>
-            <a:r>
-              <a:rPr lang="en-US" sz="3200" dirty="0" smtClean="0">
-                <a:solidFill>
-                  <a:srgbClr val="D2BD62"/>
-                </a:solidFill>
-              </a:rPr>
-              <a:t>City</a:t>
-            </a:r>
-          </a:p>
-          <a:p>
-            <a:pPr marL="742950" lvl="1" indent="-285750">
-              <a:buFont typeface="Arial" charset="0"/>
-              <a:buChar char="•"/>
-            </a:pPr>
-            <a:r>
-              <a:rPr lang="en-US" sz="3200" dirty="0" smtClean="0">
-                <a:solidFill>
-                  <a:srgbClr val="D2BD62"/>
-                </a:solidFill>
-              </a:rPr>
-              <a:t>Field</a:t>
-            </a:r>
-          </a:p>
-          <a:p>
-            <a:pPr marL="742950" lvl="1" indent="-285750">
-              <a:buFont typeface="Arial" charset="0"/>
-              <a:buChar char="•"/>
-            </a:pPr>
-            <a:r>
-              <a:rPr lang="en-US" sz="3200" dirty="0" smtClean="0">
-                <a:solidFill>
-                  <a:srgbClr val="D2BD62"/>
-                </a:solidFill>
-              </a:rPr>
-              <a:t>Winter city</a:t>
-            </a:r>
-          </a:p>
-          <a:p>
-            <a:pPr marL="742950" lvl="1" indent="-285750">
-              <a:buFont typeface="Arial" charset="0"/>
-              <a:buChar char="•"/>
-            </a:pPr>
-            <a:endParaRPr lang="en-CA" sz="3200" dirty="0" smtClean="0">
-              <a:solidFill>
-                <a:srgbClr val="D2BD62"/>
-              </a:solidFill>
-            </a:endParaRPr>
-          </a:p>
-          <a:p>
-            <a:pPr marL="285750" indent="-285750">
-              <a:buFont typeface="Arial" charset="0"/>
-              <a:buChar char="•"/>
-            </a:pPr>
-            <a:endParaRPr lang="en-US" sz="3200" dirty="0">
-              <a:solidFill>
-                <a:srgbClr val="D2BD62"/>
-              </a:solidFill>
-            </a:endParaRPr>
-          </a:p>
-        </p:txBody>
-      </p:sp>
-      <p:pic>
-        <p:nvPicPr>
-          <p:cNvPr id="3" name="Picture 2"/>
-          <p:cNvPicPr>
-            <a:picLocks noChangeAspect="1"/>
-          </p:cNvPicPr>
-          <p:nvPr/>
-        </p:nvPicPr>
-        <p:blipFill>
-          <a:blip r:embed="rId3">
-            <a:extLst>
-              <a:ext uri="{28A0092B-C50C-407E-A947-70E740481C1C}">
-                <a14:useLocalDpi xmlns:a14="http://schemas.microsoft.com/office/drawing/2010/main" val="0"/>
-              </a:ext>
-            </a:extLst>
-          </a:blip>
-          <a:stretch>
-            <a:fillRect/>
-          </a:stretch>
-        </p:blipFill>
-        <p:spPr>
-          <a:xfrm>
-            <a:off x="5200650" y="3429000"/>
-            <a:ext cx="5000625" cy="2812852"/>
+            <a:off x="7511303" y="2237699"/>
+            <a:ext cx="4680697" cy="4620301"/>
           </a:xfrm>
           <a:prstGeom prst="rect">
             <a:avLst/>
           </a:prstGeom>
         </p:spPr>
       </p:pic>
+      <p:sp>
+        <p:nvSpPr>
+          <p:cNvPr id="3" name="Content Placeholder 2"/>
+          <p:cNvSpPr>
+            <a:spLocks noGrp="1"/>
+          </p:cNvSpPr>
+          <p:nvPr>
+            <p:ph idx="1"/>
+          </p:nvPr>
+        </p:nvSpPr>
+        <p:spPr>
+          <a:xfrm>
+            <a:off x="285750" y="1690688"/>
+            <a:ext cx="7225553" cy="4748212"/>
+          </a:xfrm>
+        </p:spPr>
+        <p:txBody>
+          <a:bodyPr>
+            <a:noAutofit/>
+          </a:bodyPr>
+          <a:lstStyle/>
+          <a:p>
+            <a:r>
+              <a:rPr lang="en-US" sz="3200" dirty="0" smtClean="0"/>
+              <a:t>Failed </a:t>
+            </a:r>
+            <a:r>
+              <a:rPr lang="en-US" sz="3200" dirty="0"/>
+              <a:t>scientific experiment</a:t>
+            </a:r>
+          </a:p>
+          <a:p>
+            <a:r>
+              <a:rPr lang="en-US" sz="3200" dirty="0"/>
+              <a:t>“The warriors of light” trying to find the cure</a:t>
+            </a:r>
+          </a:p>
+          <a:p>
+            <a:r>
+              <a:rPr lang="en-US" sz="3200" dirty="0"/>
+              <a:t>The professor from Alberta has a secret formula</a:t>
+            </a:r>
+          </a:p>
+          <a:p>
+            <a:r>
+              <a:rPr lang="en-US" sz="3200" dirty="0"/>
+              <a:t>Help the Warriors to clear the path to the largest security </a:t>
+            </a:r>
+            <a:r>
+              <a:rPr lang="en-US" sz="3200" dirty="0" smtClean="0"/>
+              <a:t>checkpoints</a:t>
+            </a:r>
+          </a:p>
+          <a:p>
+            <a:r>
+              <a:rPr lang="en-US" sz="3200" dirty="0"/>
+              <a:t>The initial idea came from “The Walking </a:t>
+            </a:r>
+            <a:r>
+              <a:rPr lang="en-US" sz="3200" dirty="0" smtClean="0"/>
+              <a:t>Dead”</a:t>
+            </a:r>
+            <a:endParaRPr lang="en-US" sz="3200" dirty="0"/>
+          </a:p>
+        </p:txBody>
+      </p:sp>
     </p:spTree>
     <p:extLst>
       <p:ext uri="{BB962C8B-B14F-4D97-AF65-F5344CB8AC3E}">
-        <p14:creationId xmlns:p14="http://schemas.microsoft.com/office/powerpoint/2010/main" val="898503028"/>
+        <p14:creationId xmlns:p14="http://schemas.microsoft.com/office/powerpoint/2010/main" val="1012421941"/>
       </p:ext>
     </p:extLst>
   </p:cSld>
@@ -5137,578 +4371,146 @@
         </p:nvSpPr>
         <p:spPr/>
         <p:txBody>
-          <a:bodyPr/>
-          <a:lstStyle/>
-          <a:p>
-            <a:endParaRPr lang="en-US"/>
+          <a:bodyPr>
+            <a:normAutofit/>
+          </a:bodyPr>
+          <a:lstStyle/>
+          <a:p>
+            <a:r>
+              <a:rPr lang="en-US" sz="4800" dirty="0" smtClean="0">
+                <a:solidFill>
+                  <a:srgbClr val="770000"/>
+                </a:solidFill>
+              </a:rPr>
+              <a:t>Game</a:t>
+            </a:r>
+            <a:r>
+              <a:rPr lang="en-US" sz="4800" dirty="0" smtClean="0"/>
+              <a:t> </a:t>
+            </a:r>
+            <a:r>
+              <a:rPr lang="en-US" sz="4800" dirty="0" smtClean="0">
+                <a:solidFill>
+                  <a:srgbClr val="770000"/>
+                </a:solidFill>
+              </a:rPr>
+              <a:t>Story</a:t>
+            </a:r>
+            <a:endParaRPr lang="en-US" sz="4800" dirty="0">
+              <a:solidFill>
+                <a:srgbClr val="770000"/>
+              </a:solidFill>
+            </a:endParaRPr>
           </a:p>
         </p:txBody>
       </p:sp>
       <p:pic>
         <p:nvPicPr>
-          <p:cNvPr id="4" name="Content Placeholder 3"/>
+          <p:cNvPr id="4" name="Picture 3"/>
           <p:cNvPicPr>
-            <a:picLocks noGrp="1" noChangeAspect="1"/>
+            <a:picLocks noChangeAspect="1"/>
           </p:cNvPicPr>
-          <p:nvPr>
-            <p:ph idx="1"/>
-          </p:nvPr>
+          <p:nvPr/>
         </p:nvPicPr>
         <p:blipFill>
-          <a:blip r:embed="rId3">
-            <a:extLst>
-              <a:ext uri="{28A0092B-C50C-407E-A947-70E740481C1C}">
-                <a14:useLocalDpi xmlns:a14="http://schemas.microsoft.com/office/drawing/2010/main" val="0"/>
-              </a:ext>
-            </a:extLst>
-          </a:blip>
+          <a:blip r:embed="rId2"/>
           <a:stretch>
             <a:fillRect/>
           </a:stretch>
         </p:blipFill>
         <p:spPr>
           <a:xfrm>
-            <a:off x="0" y="0"/>
-            <a:ext cx="12192000" cy="6858000"/>
-          </a:xfrm>
-        </p:spPr>
-      </p:pic>
-      <p:sp>
-        <p:nvSpPr>
-          <p:cNvPr id="5" name="Title 1"/>
-          <p:cNvSpPr txBox="1">
-            <a:spLocks/>
-          </p:cNvSpPr>
-          <p:nvPr/>
-        </p:nvSpPr>
-        <p:spPr>
-          <a:xfrm>
-            <a:off x="990600" y="517525"/>
-            <a:ext cx="10515600" cy="1325563"/>
+            <a:off x="7511303" y="2237699"/>
+            <a:ext cx="4680697" cy="4620301"/>
           </a:xfrm>
           <a:prstGeom prst="rect">
             <a:avLst/>
           </a:prstGeom>
         </p:spPr>
-        <p:txBody>
-          <a:bodyPr vert="horz" lIns="91440" tIns="45720" rIns="91440" bIns="45720" rtlCol="0" anchor="ctr">
-            <a:normAutofit/>
-          </a:bodyPr>
-          <a:lstStyle>
-            <a:lvl1pPr algn="l" defTabSz="914400" rtl="0" eaLnBrk="1" latinLnBrk="0" hangingPunct="1">
-              <a:lnSpc>
-                <a:spcPct val="90000"/>
-              </a:lnSpc>
-              <a:spcBef>
-                <a:spcPct val="0"/>
-              </a:spcBef>
-              <a:buNone/>
-              <a:defRPr sz="4400" kern="1200">
-                <a:solidFill>
-                  <a:schemeClr val="tx1"/>
-                </a:solidFill>
-                <a:latin typeface="+mj-lt"/>
-                <a:ea typeface="+mj-ea"/>
-                <a:cs typeface="+mj-cs"/>
-              </a:defRPr>
-            </a:lvl1pPr>
-          </a:lstStyle>
-          <a:p>
-            <a:pPr algn="ctr"/>
-            <a:r>
-              <a:rPr lang="en-US" sz="6000" dirty="0" smtClean="0">
-                <a:solidFill>
-                  <a:srgbClr val="E8D16D"/>
-                </a:solidFill>
-                <a:latin typeface="Franklin Gothic Heavy" charset="0"/>
-                <a:ea typeface="Franklin Gothic Heavy" charset="0"/>
-                <a:cs typeface="Franklin Gothic Heavy" charset="0"/>
-              </a:rPr>
-              <a:t>Tools Used</a:t>
-            </a:r>
-            <a:endParaRPr lang="en-US" sz="6000" dirty="0">
-              <a:solidFill>
-                <a:srgbClr val="E8D16D"/>
-              </a:solidFill>
-              <a:latin typeface="Franklin Gothic Heavy" charset="0"/>
-              <a:ea typeface="Franklin Gothic Heavy" charset="0"/>
-              <a:cs typeface="Franklin Gothic Heavy" charset="0"/>
-            </a:endParaRPr>
-          </a:p>
-        </p:txBody>
-      </p:sp>
-      <p:sp>
-        <p:nvSpPr>
-          <p:cNvPr id="8" name="TextBox 7"/>
-          <p:cNvSpPr txBox="1"/>
-          <p:nvPr/>
+      </p:pic>
+      <p:sp>
+        <p:nvSpPr>
+          <p:cNvPr id="3" name="Content Placeholder 2"/>
+          <p:cNvSpPr>
+            <a:spLocks noGrp="1"/>
+          </p:cNvSpPr>
+          <p:nvPr>
+            <p:ph idx="1"/>
+          </p:nvPr>
         </p:nvSpPr>
         <p:spPr>
           <a:xfrm>
-            <a:off x="1308339" y="2187995"/>
-            <a:ext cx="9575322" cy="2062103"/>
+            <a:off x="285750" y="1690688"/>
+            <a:ext cx="7225553" cy="4748212"/>
           </a:xfrm>
-          <a:prstGeom prst="rect">
-            <a:avLst/>
-          </a:prstGeom>
-          <a:noFill/>
         </p:spPr>
         <p:txBody>
-          <a:bodyPr wrap="square" rtlCol="0">
-            <a:spAutoFit/>
+          <a:bodyPr>
+            <a:noAutofit/>
           </a:bodyPr>
           <a:lstStyle/>
           <a:p>
-            <a:pPr marL="285750" indent="-285750">
-              <a:buFont typeface="Arial" charset="0"/>
-              <a:buChar char="•"/>
-            </a:pPr>
-            <a:r>
-              <a:rPr lang="en-US" sz="3200" dirty="0" smtClean="0">
-                <a:solidFill>
-                  <a:srgbClr val="D2BD62"/>
-                </a:solidFill>
-              </a:rPr>
-              <a:t>Visual Studio Code - V</a:t>
-            </a:r>
-            <a:r>
-              <a:rPr lang="it-IT" sz="3200" dirty="0" err="1" smtClean="0">
-                <a:solidFill>
-                  <a:srgbClr val="D2BD62"/>
-                </a:solidFill>
-              </a:rPr>
-              <a:t>ersion</a:t>
-            </a:r>
-            <a:r>
-              <a:rPr lang="it-IT" sz="3200" dirty="0" smtClean="0">
-                <a:solidFill>
-                  <a:srgbClr val="D2BD62"/>
-                </a:solidFill>
-              </a:rPr>
-              <a:t> 1.14.2</a:t>
-            </a:r>
-          </a:p>
-          <a:p>
-            <a:pPr marL="285750" indent="-285750">
-              <a:buFont typeface="Arial" charset="0"/>
-              <a:buChar char="•"/>
-            </a:pPr>
-            <a:r>
-              <a:rPr lang="it-IT" sz="3200" dirty="0" smtClean="0">
-                <a:solidFill>
-                  <a:srgbClr val="D2BD62"/>
-                </a:solidFill>
-              </a:rPr>
-              <a:t>GIMP  - image editing and special text </a:t>
-            </a:r>
-            <a:r>
-              <a:rPr lang="it-IT" sz="3200" dirty="0" err="1" smtClean="0">
-                <a:solidFill>
-                  <a:srgbClr val="D2BD62"/>
-                </a:solidFill>
-              </a:rPr>
-              <a:t>effects</a:t>
-            </a:r>
-            <a:endParaRPr lang="it-IT" sz="3200" dirty="0" smtClean="0">
-              <a:solidFill>
-                <a:srgbClr val="D2BD62"/>
-              </a:solidFill>
-            </a:endParaRPr>
-          </a:p>
-          <a:p>
-            <a:pPr marL="285750" indent="-285750">
-              <a:buFont typeface="Arial" charset="0"/>
-              <a:buChar char="•"/>
-            </a:pPr>
-            <a:r>
-              <a:rPr lang="it-IT" sz="3200" dirty="0" err="1" smtClean="0">
-                <a:solidFill>
-                  <a:srgbClr val="D2BD62"/>
-                </a:solidFill>
-              </a:rPr>
-              <a:t>GitHub</a:t>
-            </a:r>
-            <a:r>
-              <a:rPr lang="it-IT" sz="3200" dirty="0" smtClean="0">
-                <a:solidFill>
-                  <a:srgbClr val="D2BD62"/>
-                </a:solidFill>
-              </a:rPr>
-              <a:t> </a:t>
-            </a:r>
-            <a:r>
-              <a:rPr lang="mr-IN" sz="3200" dirty="0" smtClean="0">
-                <a:solidFill>
-                  <a:srgbClr val="D2BD62"/>
-                </a:solidFill>
-              </a:rPr>
-              <a:t>–</a:t>
-            </a:r>
-            <a:r>
-              <a:rPr lang="it-IT" sz="3200" dirty="0" smtClean="0">
-                <a:solidFill>
-                  <a:srgbClr val="D2BD62"/>
-                </a:solidFill>
-              </a:rPr>
-              <a:t> </a:t>
-            </a:r>
-            <a:r>
-              <a:rPr lang="it-IT" sz="3200" dirty="0" err="1" smtClean="0">
-                <a:solidFill>
-                  <a:srgbClr val="D2BD62"/>
-                </a:solidFill>
-              </a:rPr>
-              <a:t>version</a:t>
-            </a:r>
-            <a:r>
-              <a:rPr lang="it-IT" sz="3200" dirty="0" smtClean="0">
-                <a:solidFill>
-                  <a:srgbClr val="D2BD62"/>
-                </a:solidFill>
-              </a:rPr>
-              <a:t> control</a:t>
-            </a:r>
-          </a:p>
-          <a:p>
-            <a:pPr marL="285750" indent="-285750">
-              <a:buFont typeface="Arial" charset="0"/>
-              <a:buChar char="•"/>
-            </a:pPr>
-            <a:r>
-              <a:rPr lang="it-IT" sz="3200" dirty="0" err="1" smtClean="0">
-                <a:solidFill>
-                  <a:srgbClr val="D2BD62"/>
-                </a:solidFill>
-              </a:rPr>
-              <a:t>Azure</a:t>
-            </a:r>
-            <a:r>
-              <a:rPr lang="it-IT" sz="3200" dirty="0" smtClean="0">
-                <a:solidFill>
-                  <a:srgbClr val="D2BD62"/>
-                </a:solidFill>
-              </a:rPr>
-              <a:t> </a:t>
-            </a:r>
-            <a:r>
-              <a:rPr lang="mr-IN" sz="3200" dirty="0" smtClean="0">
-                <a:solidFill>
-                  <a:srgbClr val="D2BD62"/>
-                </a:solidFill>
-              </a:rPr>
-              <a:t>–</a:t>
-            </a:r>
-            <a:r>
-              <a:rPr lang="en-CA" sz="3200" dirty="0" smtClean="0">
-                <a:solidFill>
-                  <a:srgbClr val="D2BD62"/>
-                </a:solidFill>
-              </a:rPr>
-              <a:t> free</a:t>
-            </a:r>
-            <a:r>
-              <a:rPr lang="it-IT" sz="3200" dirty="0" smtClean="0">
-                <a:solidFill>
-                  <a:srgbClr val="D2BD62"/>
-                </a:solidFill>
-              </a:rPr>
-              <a:t> </a:t>
-            </a:r>
-            <a:r>
-              <a:rPr lang="it-IT" sz="3200" dirty="0" err="1" smtClean="0">
-                <a:solidFill>
-                  <a:srgbClr val="D2BD62"/>
-                </a:solidFill>
-              </a:rPr>
-              <a:t>host</a:t>
-            </a:r>
-            <a:r>
-              <a:rPr lang="it-IT" sz="3200" dirty="0" smtClean="0">
-                <a:solidFill>
-                  <a:srgbClr val="D2BD62"/>
-                </a:solidFill>
-              </a:rPr>
-              <a:t> for the game </a:t>
-            </a:r>
-            <a:endParaRPr lang="en-US" sz="3200" dirty="0">
-              <a:solidFill>
-                <a:srgbClr val="D2BD62"/>
-              </a:solidFill>
-            </a:endParaRPr>
+            <a:r>
+              <a:rPr lang="en-US" sz="3200" dirty="0" smtClean="0"/>
+              <a:t>Failed </a:t>
+            </a:r>
+            <a:r>
+              <a:rPr lang="en-US" sz="3200" dirty="0"/>
+              <a:t>scientific experiment</a:t>
+            </a:r>
+          </a:p>
+          <a:p>
+            <a:r>
+              <a:rPr lang="en-US" sz="3200" dirty="0"/>
+              <a:t>“The warriors of light” trying to find the cure</a:t>
+            </a:r>
+          </a:p>
+          <a:p>
+            <a:r>
+              <a:rPr lang="en-US" sz="3200" dirty="0"/>
+              <a:t>The professor from Alberta has a secret formula</a:t>
+            </a:r>
+          </a:p>
+          <a:p>
+            <a:r>
+              <a:rPr lang="en-US" sz="3200" dirty="0"/>
+              <a:t>Help the Warriors to clear the path to the largest security </a:t>
+            </a:r>
+            <a:r>
+              <a:rPr lang="en-US" sz="3200" dirty="0" smtClean="0"/>
+              <a:t>checkpoints</a:t>
+            </a:r>
+          </a:p>
+          <a:p>
+            <a:r>
+              <a:rPr lang="en-US" sz="3200" dirty="0"/>
+              <a:t>The initial idea came from “The Walking </a:t>
+            </a:r>
+            <a:r>
+              <a:rPr lang="en-US" sz="3200" dirty="0" smtClean="0"/>
+              <a:t>Dead”</a:t>
+            </a:r>
+            <a:endParaRPr lang="en-US" sz="3200" dirty="0"/>
           </a:p>
         </p:txBody>
       </p:sp>
     </p:spTree>
     <p:extLst>
       <p:ext uri="{BB962C8B-B14F-4D97-AF65-F5344CB8AC3E}">
-        <p14:creationId xmlns:p14="http://schemas.microsoft.com/office/powerpoint/2010/main" val="1504404540"/>
+        <p14:creationId xmlns:p14="http://schemas.microsoft.com/office/powerpoint/2010/main" val="1262627206"/>
       </p:ext>
     </p:extLst>
   </p:cSld>
   <p:clrMapOvr>
     <a:masterClrMapping/>
   </p:clrMapOvr>
-</p:sld>
-</file>
-
-<file path=ppt/slides/slide7.xml><?xml version="1.0" encoding="utf-8"?>
-<p:sld xmlns:a="http://schemas.openxmlformats.org/drawingml/2006/main" xmlns:r="http://schemas.openxmlformats.org/officeDocument/2006/relationships" xmlns:p="http://schemas.openxmlformats.org/presentationml/2006/main">
-  <p:cSld>
-    <p:spTree>
-      <p:nvGrpSpPr>
-        <p:cNvPr id="1" name=""/>
-        <p:cNvGrpSpPr/>
-        <p:nvPr/>
-      </p:nvGrpSpPr>
-      <p:grpSpPr>
-        <a:xfrm>
-          <a:off x="0" y="0"/>
-          <a:ext cx="0" cy="0"/>
-          <a:chOff x="0" y="0"/>
-          <a:chExt cx="0" cy="0"/>
-        </a:xfrm>
-      </p:grpSpPr>
-      <p:sp>
-        <p:nvSpPr>
-          <p:cNvPr id="2" name="Title 1"/>
-          <p:cNvSpPr>
-            <a:spLocks noGrp="1"/>
-          </p:cNvSpPr>
-          <p:nvPr>
-            <p:ph type="title"/>
-          </p:nvPr>
-        </p:nvSpPr>
-        <p:spPr/>
-        <p:txBody>
-          <a:bodyPr/>
-          <a:lstStyle/>
-          <a:p>
-            <a:endParaRPr lang="en-US"/>
-          </a:p>
-        </p:txBody>
-      </p:sp>
-      <p:pic>
-        <p:nvPicPr>
-          <p:cNvPr id="4" name="Content Placeholder 3"/>
-          <p:cNvPicPr>
-            <a:picLocks noGrp="1" noChangeAspect="1"/>
-          </p:cNvPicPr>
-          <p:nvPr>
-            <p:ph idx="1"/>
-          </p:nvPr>
-        </p:nvPicPr>
-        <p:blipFill>
-          <a:blip r:embed="rId2">
-            <a:extLst>
-              <a:ext uri="{28A0092B-C50C-407E-A947-70E740481C1C}">
-                <a14:useLocalDpi xmlns:a14="http://schemas.microsoft.com/office/drawing/2010/main" val="0"/>
-              </a:ext>
-            </a:extLst>
-          </a:blip>
-          <a:stretch>
-            <a:fillRect/>
-          </a:stretch>
-        </p:blipFill>
-        <p:spPr>
-          <a:xfrm>
-            <a:off x="0" y="0"/>
-            <a:ext cx="12192000" cy="6858000"/>
-          </a:xfrm>
-        </p:spPr>
-      </p:pic>
-      <p:sp>
-        <p:nvSpPr>
-          <p:cNvPr id="5" name="Title 1"/>
-          <p:cNvSpPr txBox="1">
-            <a:spLocks/>
-          </p:cNvSpPr>
-          <p:nvPr/>
-        </p:nvSpPr>
-        <p:spPr>
-          <a:xfrm>
-            <a:off x="990600" y="517525"/>
-            <a:ext cx="10515600" cy="1325563"/>
-          </a:xfrm>
-          <a:prstGeom prst="rect">
-            <a:avLst/>
-          </a:prstGeom>
-        </p:spPr>
-        <p:txBody>
-          <a:bodyPr vert="horz" lIns="91440" tIns="45720" rIns="91440" bIns="45720" rtlCol="0" anchor="ctr">
-            <a:normAutofit/>
-          </a:bodyPr>
-          <a:lstStyle>
-            <a:lvl1pPr algn="l" defTabSz="914400" rtl="0" eaLnBrk="1" latinLnBrk="0" hangingPunct="1">
-              <a:lnSpc>
-                <a:spcPct val="90000"/>
-              </a:lnSpc>
-              <a:spcBef>
-                <a:spcPct val="0"/>
-              </a:spcBef>
-              <a:buNone/>
-              <a:defRPr sz="4400" kern="1200">
-                <a:solidFill>
-                  <a:schemeClr val="tx1"/>
-                </a:solidFill>
-                <a:latin typeface="+mj-lt"/>
-                <a:ea typeface="+mj-ea"/>
-                <a:cs typeface="+mj-cs"/>
-              </a:defRPr>
-            </a:lvl1pPr>
-          </a:lstStyle>
-          <a:p>
-            <a:pPr algn="ctr"/>
-            <a:r>
-              <a:rPr lang="en-US" sz="6000" dirty="0" smtClean="0">
-                <a:solidFill>
-                  <a:srgbClr val="E8D16D"/>
-                </a:solidFill>
-                <a:latin typeface="Franklin Gothic Heavy" charset="0"/>
-                <a:ea typeface="Franklin Gothic Heavy" charset="0"/>
-                <a:cs typeface="Franklin Gothic Heavy" charset="0"/>
-              </a:rPr>
-              <a:t>Next Steps</a:t>
-            </a:r>
-            <a:endParaRPr lang="en-US" sz="6000" dirty="0">
-              <a:solidFill>
-                <a:srgbClr val="E8D16D"/>
-              </a:solidFill>
-              <a:latin typeface="Franklin Gothic Heavy" charset="0"/>
-              <a:ea typeface="Franklin Gothic Heavy" charset="0"/>
-              <a:cs typeface="Franklin Gothic Heavy" charset="0"/>
-            </a:endParaRPr>
-          </a:p>
-        </p:txBody>
-      </p:sp>
-      <p:sp>
-        <p:nvSpPr>
-          <p:cNvPr id="6" name="TextBox 5"/>
-          <p:cNvSpPr txBox="1"/>
-          <p:nvPr/>
-        </p:nvSpPr>
-        <p:spPr>
-          <a:xfrm>
-            <a:off x="1308339" y="1914976"/>
-            <a:ext cx="9575322" cy="4031873"/>
-          </a:xfrm>
-          <a:prstGeom prst="rect">
-            <a:avLst/>
-          </a:prstGeom>
-          <a:noFill/>
-        </p:spPr>
-        <p:txBody>
-          <a:bodyPr wrap="square" rtlCol="0">
-            <a:spAutoFit/>
-          </a:bodyPr>
-          <a:lstStyle/>
-          <a:p>
-            <a:pPr marL="285750" indent="-285750">
-              <a:buFont typeface="Arial" charset="0"/>
-              <a:buChar char="•"/>
-            </a:pPr>
-            <a:r>
-              <a:rPr lang="en-US" sz="3200" dirty="0" smtClean="0">
-                <a:solidFill>
-                  <a:srgbClr val="D2BD62"/>
-                </a:solidFill>
-              </a:rPr>
-              <a:t>Select(or draw) weapons images and animations</a:t>
-            </a:r>
-            <a:r>
-              <a:rPr lang="uk-UA" sz="3200" dirty="0" smtClean="0">
-                <a:solidFill>
-                  <a:srgbClr val="D2BD62"/>
-                </a:solidFill>
-              </a:rPr>
-              <a:t> (</a:t>
-            </a:r>
-            <a:r>
-              <a:rPr lang="en-CA" sz="3200" dirty="0" smtClean="0">
-                <a:solidFill>
-                  <a:srgbClr val="D2BD62"/>
-                </a:solidFill>
-              </a:rPr>
-              <a:t>shooting, turrets rotation etc.)</a:t>
-            </a:r>
-          </a:p>
-          <a:p>
-            <a:pPr marL="285750" indent="-285750">
-              <a:buFont typeface="Arial" charset="0"/>
-              <a:buChar char="•"/>
-            </a:pPr>
-            <a:r>
-              <a:rPr lang="en-CA" sz="3200" dirty="0" smtClean="0">
-                <a:solidFill>
-                  <a:srgbClr val="D2BD62"/>
-                </a:solidFill>
-              </a:rPr>
-              <a:t>Create sprite sheets with enemies and implement their animation(walking in four directions, dying etc.)</a:t>
-            </a:r>
-            <a:endParaRPr lang="en-US" sz="3200" dirty="0" smtClean="0">
-              <a:solidFill>
-                <a:srgbClr val="D2BD62"/>
-              </a:solidFill>
-            </a:endParaRPr>
-          </a:p>
-          <a:p>
-            <a:pPr marL="285750" indent="-285750">
-              <a:buFont typeface="Arial" charset="0"/>
-              <a:buChar char="•"/>
-            </a:pPr>
-            <a:r>
-              <a:rPr lang="en-US" sz="3200" dirty="0" smtClean="0">
-                <a:solidFill>
-                  <a:srgbClr val="D2BD62"/>
-                </a:solidFill>
-              </a:rPr>
-              <a:t>Create maps</a:t>
-            </a:r>
-          </a:p>
-          <a:p>
-            <a:pPr marL="285750" indent="-285750">
-              <a:buFont typeface="Arial" charset="0"/>
-              <a:buChar char="•"/>
-            </a:pPr>
-            <a:r>
-              <a:rPr lang="en-US" sz="3200" dirty="0" smtClean="0">
-                <a:solidFill>
-                  <a:srgbClr val="D2BD62"/>
-                </a:solidFill>
-              </a:rPr>
-              <a:t>Implement first two game levels</a:t>
-            </a:r>
-          </a:p>
-          <a:p>
-            <a:pPr marL="285750" indent="-285750">
-              <a:buFont typeface="Arial" charset="0"/>
-              <a:buChar char="•"/>
-            </a:pPr>
-            <a:r>
-              <a:rPr lang="en-US" sz="3200" dirty="0" smtClean="0">
-                <a:solidFill>
-                  <a:srgbClr val="D2BD62"/>
-                </a:solidFill>
-              </a:rPr>
-              <a:t>Modify game interface(add menu controls to build turrets, access game settings and home screen)</a:t>
-            </a:r>
-            <a:endParaRPr lang="en-US" sz="3200" dirty="0">
-              <a:solidFill>
-                <a:srgbClr val="D2BD62"/>
-              </a:solidFill>
-            </a:endParaRPr>
-          </a:p>
-        </p:txBody>
-      </p:sp>
-    </p:spTree>
-    <p:extLst>
-      <p:ext uri="{BB962C8B-B14F-4D97-AF65-F5344CB8AC3E}">
-        <p14:creationId xmlns:p14="http://schemas.microsoft.com/office/powerpoint/2010/main" val="54644002"/>
-      </p:ext>
-    </p:extLst>
-  </p:cSld>
-  <p:clrMapOvr>
-    <a:masterClrMapping/>
-  </p:clrMapOvr>
+  <p:timing>
+    <p:tnLst>
+      <p:par>
+        <p:cTn id="1" dur="indefinite" restart="never" nodeType="tmRoot"/>
+      </p:par>
+    </p:tnLst>
+  </p:timing>
 </p:sld>
 </file>
 

</xml_diff>